<commit_message>
🛠️ Add solution to Tutorial01
</commit_message>
<xml_diff>
--- a/Lectures/UCD-MScAI-Lecture-1.pptx
+++ b/Lectures/UCD-MScAI-Lecture-1.pptx
@@ -5,42 +5,46 @@
     <p:sldMasterId id="2147483648" r:id="rId1"/>
   </p:sldMasterIdLst>
   <p:notesMasterIdLst>
-    <p:notesMasterId r:id="rId35"/>
+    <p:notesMasterId r:id="rId39"/>
   </p:notesMasterIdLst>
   <p:sldIdLst>
     <p:sldId id="256" r:id="rId2"/>
-    <p:sldId id="258" r:id="rId3"/>
-    <p:sldId id="257" r:id="rId4"/>
-    <p:sldId id="271" r:id="rId5"/>
-    <p:sldId id="259" r:id="rId6"/>
-    <p:sldId id="272" r:id="rId7"/>
-    <p:sldId id="260" r:id="rId8"/>
-    <p:sldId id="274" r:id="rId9"/>
-    <p:sldId id="273" r:id="rId10"/>
-    <p:sldId id="261" r:id="rId11"/>
-    <p:sldId id="262" r:id="rId12"/>
-    <p:sldId id="263" r:id="rId13"/>
-    <p:sldId id="265" r:id="rId14"/>
-    <p:sldId id="275" r:id="rId15"/>
-    <p:sldId id="276" r:id="rId16"/>
-    <p:sldId id="277" r:id="rId17"/>
-    <p:sldId id="278" r:id="rId18"/>
-    <p:sldId id="264" r:id="rId19"/>
-    <p:sldId id="266" r:id="rId20"/>
-    <p:sldId id="267" r:id="rId21"/>
-    <p:sldId id="269" r:id="rId22"/>
-    <p:sldId id="268" r:id="rId23"/>
-    <p:sldId id="270" r:id="rId24"/>
-    <p:sldId id="284" r:id="rId25"/>
-    <p:sldId id="281" r:id="rId26"/>
-    <p:sldId id="282" r:id="rId27"/>
-    <p:sldId id="279" r:id="rId28"/>
-    <p:sldId id="283" r:id="rId29"/>
-    <p:sldId id="280" r:id="rId30"/>
-    <p:sldId id="285" r:id="rId31"/>
-    <p:sldId id="286" r:id="rId32"/>
-    <p:sldId id="288" r:id="rId33"/>
-    <p:sldId id="289" r:id="rId34"/>
+    <p:sldId id="293" r:id="rId3"/>
+    <p:sldId id="258" r:id="rId4"/>
+    <p:sldId id="257" r:id="rId5"/>
+    <p:sldId id="271" r:id="rId6"/>
+    <p:sldId id="259" r:id="rId7"/>
+    <p:sldId id="272" r:id="rId8"/>
+    <p:sldId id="260" r:id="rId9"/>
+    <p:sldId id="274" r:id="rId10"/>
+    <p:sldId id="273" r:id="rId11"/>
+    <p:sldId id="261" r:id="rId12"/>
+    <p:sldId id="290" r:id="rId13"/>
+    <p:sldId id="291" r:id="rId14"/>
+    <p:sldId id="292" r:id="rId15"/>
+    <p:sldId id="262" r:id="rId16"/>
+    <p:sldId id="263" r:id="rId17"/>
+    <p:sldId id="265" r:id="rId18"/>
+    <p:sldId id="275" r:id="rId19"/>
+    <p:sldId id="276" r:id="rId20"/>
+    <p:sldId id="277" r:id="rId21"/>
+    <p:sldId id="278" r:id="rId22"/>
+    <p:sldId id="264" r:id="rId23"/>
+    <p:sldId id="266" r:id="rId24"/>
+    <p:sldId id="267" r:id="rId25"/>
+    <p:sldId id="269" r:id="rId26"/>
+    <p:sldId id="268" r:id="rId27"/>
+    <p:sldId id="270" r:id="rId28"/>
+    <p:sldId id="284" r:id="rId29"/>
+    <p:sldId id="281" r:id="rId30"/>
+    <p:sldId id="282" r:id="rId31"/>
+    <p:sldId id="279" r:id="rId32"/>
+    <p:sldId id="283" r:id="rId33"/>
+    <p:sldId id="280" r:id="rId34"/>
+    <p:sldId id="285" r:id="rId35"/>
+    <p:sldId id="286" r:id="rId36"/>
+    <p:sldId id="288" r:id="rId37"/>
+    <p:sldId id="289" r:id="rId38"/>
   </p:sldIdLst>
   <p:sldSz cx="12192000" cy="6858000"/>
   <p:notesSz cx="6858000" cy="9144000"/>
@@ -229,7 +233,7 @@
           <a:p>
             <a:fld id="{A29A83B0-E2DE-074F-BC99-8CA844700D34}" type="datetimeFigureOut">
               <a:rPr lang="en-IE" smtClean="0"/>
-              <a:t>16/02/2026</a:t>
+              <a:t>17/02/2026</a:t>
             </a:fld>
             <a:endParaRPr lang="en-IE"/>
           </a:p>
@@ -562,7 +566,7 @@
           <a:p>
             <a:fld id="{DDC7EF8C-B83F-A244-859A-B2DB048B3BAD}" type="slidenum">
               <a:rPr lang="en-IE" smtClean="0"/>
-              <a:t>7</a:t>
+              <a:t>8</a:t>
             </a:fld>
             <a:endParaRPr lang="en-IE"/>
           </a:p>
@@ -670,7 +674,7 @@
           <a:p>
             <a:fld id="{DDC7EF8C-B83F-A244-859A-B2DB048B3BAD}" type="slidenum">
               <a:rPr lang="en-IE" smtClean="0"/>
-              <a:t>8</a:t>
+              <a:t>9</a:t>
             </a:fld>
             <a:endParaRPr lang="en-IE"/>
           </a:p>
@@ -778,7 +782,7 @@
           <a:p>
             <a:fld id="{DDC7EF8C-B83F-A244-859A-B2DB048B3BAD}" type="slidenum">
               <a:rPr lang="en-IE" smtClean="0"/>
-              <a:t>9</a:t>
+              <a:t>10</a:t>
             </a:fld>
             <a:endParaRPr lang="en-IE"/>
           </a:p>
@@ -862,7 +866,7 @@
           <a:p>
             <a:fld id="{DDC7EF8C-B83F-A244-859A-B2DB048B3BAD}" type="slidenum">
               <a:rPr lang="en-IE" smtClean="0"/>
-              <a:t>18</a:t>
+              <a:t>22</a:t>
             </a:fld>
             <a:endParaRPr lang="en-IE"/>
           </a:p>
@@ -946,7 +950,7 @@
           <a:p>
             <a:fld id="{DDC7EF8C-B83F-A244-859A-B2DB048B3BAD}" type="slidenum">
               <a:rPr lang="en-IE" smtClean="0"/>
-              <a:t>25</a:t>
+              <a:t>29</a:t>
             </a:fld>
             <a:endParaRPr lang="en-IE"/>
           </a:p>
@@ -1030,7 +1034,7 @@
           <a:p>
             <a:fld id="{DDC7EF8C-B83F-A244-859A-B2DB048B3BAD}" type="slidenum">
               <a:rPr lang="en-IE" smtClean="0"/>
-              <a:t>28</a:t>
+              <a:t>32</a:t>
             </a:fld>
             <a:endParaRPr lang="en-IE"/>
           </a:p>
@@ -1198,7 +1202,7 @@
           <a:p>
             <a:fld id="{6CB0F413-AF10-A848-AFA0-FB73FBAC351C}" type="datetimeFigureOut">
               <a:rPr lang="en-IE" smtClean="0"/>
-              <a:t>16/02/2026</a:t>
+              <a:t>17/02/2026</a:t>
             </a:fld>
             <a:endParaRPr lang="en-IE"/>
           </a:p>
@@ -1398,7 +1402,7 @@
           <a:p>
             <a:fld id="{6CB0F413-AF10-A848-AFA0-FB73FBAC351C}" type="datetimeFigureOut">
               <a:rPr lang="en-IE" smtClean="0"/>
-              <a:t>16/02/2026</a:t>
+              <a:t>17/02/2026</a:t>
             </a:fld>
             <a:endParaRPr lang="en-IE"/>
           </a:p>
@@ -1608,7 +1612,7 @@
           <a:p>
             <a:fld id="{6CB0F413-AF10-A848-AFA0-FB73FBAC351C}" type="datetimeFigureOut">
               <a:rPr lang="en-IE" smtClean="0"/>
-              <a:t>16/02/2026</a:t>
+              <a:t>17/02/2026</a:t>
             </a:fld>
             <a:endParaRPr lang="en-IE"/>
           </a:p>
@@ -1808,7 +1812,7 @@
           <a:p>
             <a:fld id="{6CB0F413-AF10-A848-AFA0-FB73FBAC351C}" type="datetimeFigureOut">
               <a:rPr lang="en-IE" smtClean="0"/>
-              <a:t>16/02/2026</a:t>
+              <a:t>17/02/2026</a:t>
             </a:fld>
             <a:endParaRPr lang="en-IE"/>
           </a:p>
@@ -2084,7 +2088,7 @@
           <a:p>
             <a:fld id="{6CB0F413-AF10-A848-AFA0-FB73FBAC351C}" type="datetimeFigureOut">
               <a:rPr lang="en-IE" smtClean="0"/>
-              <a:t>16/02/2026</a:t>
+              <a:t>17/02/2026</a:t>
             </a:fld>
             <a:endParaRPr lang="en-IE"/>
           </a:p>
@@ -2352,7 +2356,7 @@
           <a:p>
             <a:fld id="{6CB0F413-AF10-A848-AFA0-FB73FBAC351C}" type="datetimeFigureOut">
               <a:rPr lang="en-IE" smtClean="0"/>
-              <a:t>16/02/2026</a:t>
+              <a:t>17/02/2026</a:t>
             </a:fld>
             <a:endParaRPr lang="en-IE"/>
           </a:p>
@@ -2767,7 +2771,7 @@
           <a:p>
             <a:fld id="{6CB0F413-AF10-A848-AFA0-FB73FBAC351C}" type="datetimeFigureOut">
               <a:rPr lang="en-IE" smtClean="0"/>
-              <a:t>16/02/2026</a:t>
+              <a:t>17/02/2026</a:t>
             </a:fld>
             <a:endParaRPr lang="en-IE"/>
           </a:p>
@@ -2909,7 +2913,7 @@
           <a:p>
             <a:fld id="{6CB0F413-AF10-A848-AFA0-FB73FBAC351C}" type="datetimeFigureOut">
               <a:rPr lang="en-IE" smtClean="0"/>
-              <a:t>16/02/2026</a:t>
+              <a:t>17/02/2026</a:t>
             </a:fld>
             <a:endParaRPr lang="en-IE"/>
           </a:p>
@@ -3022,7 +3026,7 @@
           <a:p>
             <a:fld id="{6CB0F413-AF10-A848-AFA0-FB73FBAC351C}" type="datetimeFigureOut">
               <a:rPr lang="en-IE" smtClean="0"/>
-              <a:t>16/02/2026</a:t>
+              <a:t>17/02/2026</a:t>
             </a:fld>
             <a:endParaRPr lang="en-IE"/>
           </a:p>
@@ -3335,7 +3339,7 @@
           <a:p>
             <a:fld id="{6CB0F413-AF10-A848-AFA0-FB73FBAC351C}" type="datetimeFigureOut">
               <a:rPr lang="en-IE" smtClean="0"/>
-              <a:t>16/02/2026</a:t>
+              <a:t>17/02/2026</a:t>
             </a:fld>
             <a:endParaRPr lang="en-IE"/>
           </a:p>
@@ -3624,7 +3628,7 @@
           <a:p>
             <a:fld id="{6CB0F413-AF10-A848-AFA0-FB73FBAC351C}" type="datetimeFigureOut">
               <a:rPr lang="en-IE" smtClean="0"/>
-              <a:t>16/02/2026</a:t>
+              <a:t>17/02/2026</a:t>
             </a:fld>
             <a:endParaRPr lang="en-IE"/>
           </a:p>
@@ -3867,7 +3871,7 @@
           <a:p>
             <a:fld id="{6CB0F413-AF10-A848-AFA0-FB73FBAC351C}" type="datetimeFigureOut">
               <a:rPr lang="en-IE" smtClean="0"/>
-              <a:t>16/02/2026</a:t>
+              <a:t>17/02/2026</a:t>
             </a:fld>
             <a:endParaRPr lang="en-IE"/>
           </a:p>
@@ -4354,6 +4358,1080 @@
 </file>
 
 <file path=ppt/slides/slide10.xml><?xml version="1.0" encoding="utf-8"?>
+<p:sld xmlns:a="http://schemas.openxmlformats.org/drawingml/2006/main" xmlns:r="http://schemas.openxmlformats.org/officeDocument/2006/relationships" xmlns:p="http://schemas.openxmlformats.org/presentationml/2006/main">
+  <p:cSld>
+    <p:spTree>
+      <p:nvGrpSpPr>
+        <p:cNvPr id="1" name="">
+          <a:extLst>
+            <a:ext uri="{FF2B5EF4-FFF2-40B4-BE49-F238E27FC236}">
+              <a16:creationId xmlns:a16="http://schemas.microsoft.com/office/drawing/2014/main" id="{EDA5DAA9-7B74-3EFA-BDCF-73D3FF0C483D}"/>
+            </a:ext>
+          </a:extLst>
+        </p:cNvPr>
+        <p:cNvGrpSpPr/>
+        <p:nvPr/>
+      </p:nvGrpSpPr>
+      <p:grpSpPr>
+        <a:xfrm>
+          <a:off x="0" y="0"/>
+          <a:ext cx="0" cy="0"/>
+          <a:chOff x="0" y="0"/>
+          <a:chExt cx="0" cy="0"/>
+        </a:xfrm>
+      </p:grpSpPr>
+      <p:sp>
+        <p:nvSpPr>
+          <p:cNvPr id="2" name="Title 1">
+            <a:extLst>
+              <a:ext uri="{FF2B5EF4-FFF2-40B4-BE49-F238E27FC236}">
+                <a16:creationId xmlns:a16="http://schemas.microsoft.com/office/drawing/2014/main" id="{1CB3D3DC-3622-5F68-89B0-71F71F8EC397}"/>
+              </a:ext>
+            </a:extLst>
+          </p:cNvPr>
+          <p:cNvSpPr>
+            <a:spLocks noGrp="1"/>
+          </p:cNvSpPr>
+          <p:nvPr>
+            <p:ph type="title"/>
+          </p:nvPr>
+        </p:nvSpPr>
+        <p:spPr/>
+        <p:txBody>
+          <a:bodyPr/>
+          <a:lstStyle/>
+          <a:p>
+            <a:r>
+              <a:rPr lang="en-IE" dirty="0"/>
+              <a:t>How can we teach a model languages?</a:t>
+            </a:r>
+          </a:p>
+        </p:txBody>
+      </p:sp>
+      <p:pic>
+        <p:nvPicPr>
+          <p:cNvPr id="4" name="Picture 2" descr="Baby - Free people icons">
+            <a:extLst>
+              <a:ext uri="{FF2B5EF4-FFF2-40B4-BE49-F238E27FC236}">
+                <a16:creationId xmlns:a16="http://schemas.microsoft.com/office/drawing/2014/main" id="{C0393CB9-50F8-59AE-5DB3-6339D65041D8}"/>
+              </a:ext>
+            </a:extLst>
+          </p:cNvPr>
+          <p:cNvPicPr>
+            <a:picLocks noGrp="1" noChangeAspect="1" noChangeArrowheads="1"/>
+          </p:cNvPicPr>
+          <p:nvPr>
+            <p:ph idx="1"/>
+          </p:nvPr>
+        </p:nvPicPr>
+        <p:blipFill>
+          <a:blip r:embed="rId3">
+            <a:extLst>
+              <a:ext uri="{28A0092B-C50C-407E-A947-70E740481C1C}">
+                <a14:useLocalDpi xmlns:a14="http://schemas.microsoft.com/office/drawing/2010/main" val="0"/>
+              </a:ext>
+            </a:extLst>
+          </a:blip>
+          <a:srcRect/>
+          <a:stretch>
+            <a:fillRect/>
+          </a:stretch>
+        </p:blipFill>
+        <p:spPr bwMode="auto">
+          <a:xfrm>
+            <a:off x="8778028" y="4728575"/>
+            <a:ext cx="1764300" cy="1764300"/>
+          </a:xfrm>
+          <a:prstGeom prst="rect">
+            <a:avLst/>
+          </a:prstGeom>
+          <a:noFill/>
+          <a:extLst>
+            <a:ext uri="{909E8E84-426E-40DD-AFC4-6F175D3DCCD1}">
+              <a14:hiddenFill xmlns:a14="http://schemas.microsoft.com/office/drawing/2010/main">
+                <a:solidFill>
+                  <a:srgbClr val="FFFFFF"/>
+                </a:solidFill>
+              </a14:hiddenFill>
+            </a:ext>
+          </a:extLst>
+        </p:spPr>
+      </p:pic>
+      <p:pic>
+        <p:nvPicPr>
+          <p:cNvPr id="6" name="Graphic 5" descr="Robot outline">
+            <a:extLst>
+              <a:ext uri="{FF2B5EF4-FFF2-40B4-BE49-F238E27FC236}">
+                <a16:creationId xmlns:a16="http://schemas.microsoft.com/office/drawing/2014/main" id="{668BF5C5-CE54-B4B6-9508-ADB73327CACB}"/>
+              </a:ext>
+            </a:extLst>
+          </p:cNvPr>
+          <p:cNvPicPr>
+            <a:picLocks noChangeAspect="1"/>
+          </p:cNvPicPr>
+          <p:nvPr/>
+        </p:nvPicPr>
+        <p:blipFill>
+          <a:blip r:embed="rId4">
+            <a:extLst>
+              <a:ext uri="{96DAC541-7B7A-43D3-8B79-37D633B846F1}">
+                <asvg:svgBlip xmlns:asvg="http://schemas.microsoft.com/office/drawing/2016/SVG/main" r:embed="rId5"/>
+              </a:ext>
+            </a:extLst>
+          </a:blip>
+          <a:stretch>
+            <a:fillRect/>
+          </a:stretch>
+        </p:blipFill>
+        <p:spPr>
+          <a:xfrm>
+            <a:off x="10204124" y="4787138"/>
+            <a:ext cx="1647173" cy="1647173"/>
+          </a:xfrm>
+          <a:prstGeom prst="rect">
+            <a:avLst/>
+          </a:prstGeom>
+        </p:spPr>
+      </p:pic>
+      <p:grpSp>
+        <p:nvGrpSpPr>
+          <p:cNvPr id="48" name="Group 47">
+            <a:extLst>
+              <a:ext uri="{FF2B5EF4-FFF2-40B4-BE49-F238E27FC236}">
+                <a16:creationId xmlns:a16="http://schemas.microsoft.com/office/drawing/2014/main" id="{8D7D42D4-C747-D5EF-3B2E-EE221313C146}"/>
+              </a:ext>
+            </a:extLst>
+          </p:cNvPr>
+          <p:cNvGrpSpPr/>
+          <p:nvPr/>
+        </p:nvGrpSpPr>
+        <p:grpSpPr>
+          <a:xfrm>
+            <a:off x="8442404" y="2474475"/>
+            <a:ext cx="3553605" cy="1713447"/>
+            <a:chOff x="8442404" y="2474475"/>
+            <a:chExt cx="3553605" cy="1713447"/>
+          </a:xfrm>
+        </p:grpSpPr>
+        <p:sp>
+          <p:nvSpPr>
+            <p:cNvPr id="9" name="Rounded Rectangle 8">
+              <a:extLst>
+                <a:ext uri="{FF2B5EF4-FFF2-40B4-BE49-F238E27FC236}">
+                  <a16:creationId xmlns:a16="http://schemas.microsoft.com/office/drawing/2014/main" id="{C1478DEB-FF0F-FA3D-4600-CB5F4819FA37}"/>
+                </a:ext>
+              </a:extLst>
+            </p:cNvPr>
+            <p:cNvSpPr/>
+            <p:nvPr/>
+          </p:nvSpPr>
+          <p:spPr>
+            <a:xfrm>
+              <a:off x="8586631" y="3619256"/>
+              <a:ext cx="1478522" cy="563753"/>
+            </a:xfrm>
+            <a:prstGeom prst="roundRect">
+              <a:avLst/>
+            </a:prstGeom>
+            <a:solidFill>
+              <a:schemeClr val="accent2">
+                <a:lumMod val="20000"/>
+                <a:lumOff val="80000"/>
+              </a:schemeClr>
+            </a:solidFill>
+          </p:spPr>
+          <p:style>
+            <a:lnRef idx="2">
+              <a:schemeClr val="accent1">
+                <a:shade val="15000"/>
+              </a:schemeClr>
+            </a:lnRef>
+            <a:fillRef idx="1">
+              <a:schemeClr val="accent1"/>
+            </a:fillRef>
+            <a:effectRef idx="0">
+              <a:schemeClr val="accent1"/>
+            </a:effectRef>
+            <a:fontRef idx="minor">
+              <a:schemeClr val="lt1"/>
+            </a:fontRef>
+          </p:style>
+          <p:txBody>
+            <a:bodyPr rtlCol="0" anchor="ctr"/>
+            <a:lstStyle/>
+            <a:p>
+              <a:pPr algn="ctr"/>
+              <a:r>
+                <a:rPr lang="en-IE" dirty="0">
+                  <a:solidFill>
+                    <a:schemeClr val="tx1"/>
+                  </a:solidFill>
+                </a:rPr>
+                <a:t>Observation</a:t>
+              </a:r>
+            </a:p>
+          </p:txBody>
+        </p:sp>
+        <p:sp>
+          <p:nvSpPr>
+            <p:cNvPr id="11" name="Rounded Rectangle 10">
+              <a:extLst>
+                <a:ext uri="{FF2B5EF4-FFF2-40B4-BE49-F238E27FC236}">
+                  <a16:creationId xmlns:a16="http://schemas.microsoft.com/office/drawing/2014/main" id="{D4693CA2-CB77-F71D-F131-6833D127F314}"/>
+                </a:ext>
+              </a:extLst>
+            </p:cNvPr>
+            <p:cNvSpPr/>
+            <p:nvPr/>
+          </p:nvSpPr>
+          <p:spPr>
+            <a:xfrm>
+              <a:off x="9331889" y="2474475"/>
+              <a:ext cx="1605133" cy="568666"/>
+            </a:xfrm>
+            <a:prstGeom prst="roundRect">
+              <a:avLst/>
+            </a:prstGeom>
+            <a:solidFill>
+              <a:schemeClr val="accent6">
+                <a:lumMod val="40000"/>
+                <a:lumOff val="60000"/>
+              </a:schemeClr>
+            </a:solidFill>
+          </p:spPr>
+          <p:style>
+            <a:lnRef idx="2">
+              <a:schemeClr val="accent1">
+                <a:shade val="15000"/>
+              </a:schemeClr>
+            </a:lnRef>
+            <a:fillRef idx="1">
+              <a:schemeClr val="accent1"/>
+            </a:fillRef>
+            <a:effectRef idx="0">
+              <a:schemeClr val="accent1"/>
+            </a:effectRef>
+            <a:fontRef idx="minor">
+              <a:schemeClr val="lt1"/>
+            </a:fontRef>
+          </p:style>
+          <p:txBody>
+            <a:bodyPr rtlCol="0" anchor="ctr"/>
+            <a:lstStyle/>
+            <a:p>
+              <a:pPr algn="ctr"/>
+              <a:r>
+                <a:rPr lang="en-IE" dirty="0">
+                  <a:solidFill>
+                    <a:schemeClr val="tx1"/>
+                  </a:solidFill>
+                </a:rPr>
+                <a:t>General rules</a:t>
+              </a:r>
+            </a:p>
+          </p:txBody>
+        </p:sp>
+        <p:sp>
+          <p:nvSpPr>
+            <p:cNvPr id="13" name="Rounded Rectangle 12">
+              <a:extLst>
+                <a:ext uri="{FF2B5EF4-FFF2-40B4-BE49-F238E27FC236}">
+                  <a16:creationId xmlns:a16="http://schemas.microsoft.com/office/drawing/2014/main" id="{C3349ACC-8844-8BAC-A273-483516E69108}"/>
+                </a:ext>
+              </a:extLst>
+            </p:cNvPr>
+            <p:cNvSpPr/>
+            <p:nvPr/>
+          </p:nvSpPr>
+          <p:spPr>
+            <a:xfrm>
+              <a:off x="10303669" y="3619256"/>
+              <a:ext cx="1692340" cy="568666"/>
+            </a:xfrm>
+            <a:prstGeom prst="roundRect">
+              <a:avLst/>
+            </a:prstGeom>
+            <a:solidFill>
+              <a:schemeClr val="accent4">
+                <a:lumMod val="40000"/>
+                <a:lumOff val="60000"/>
+              </a:schemeClr>
+            </a:solidFill>
+          </p:spPr>
+          <p:style>
+            <a:lnRef idx="2">
+              <a:schemeClr val="accent1">
+                <a:shade val="15000"/>
+              </a:schemeClr>
+            </a:lnRef>
+            <a:fillRef idx="1">
+              <a:schemeClr val="accent1"/>
+            </a:fillRef>
+            <a:effectRef idx="0">
+              <a:schemeClr val="accent1"/>
+            </a:effectRef>
+            <a:fontRef idx="minor">
+              <a:schemeClr val="lt1"/>
+            </a:fontRef>
+          </p:style>
+          <p:txBody>
+            <a:bodyPr rtlCol="0" anchor="ctr"/>
+            <a:lstStyle/>
+            <a:p>
+              <a:pPr algn="ctr"/>
+              <a:r>
+                <a:rPr lang="en-IE" dirty="0">
+                  <a:solidFill>
+                    <a:schemeClr val="tx1"/>
+                  </a:solidFill>
+                </a:rPr>
+                <a:t>Prediction</a:t>
+              </a:r>
+            </a:p>
+          </p:txBody>
+        </p:sp>
+        <p:cxnSp>
+          <p:nvCxnSpPr>
+            <p:cNvPr id="14" name="Straight Arrow Connector 13">
+              <a:extLst>
+                <a:ext uri="{FF2B5EF4-FFF2-40B4-BE49-F238E27FC236}">
+                  <a16:creationId xmlns:a16="http://schemas.microsoft.com/office/drawing/2014/main" id="{E94FD9C1-5003-0A92-7092-35C8850E6C32}"/>
+                </a:ext>
+              </a:extLst>
+            </p:cNvPr>
+            <p:cNvCxnSpPr>
+              <a:cxnSpLocks/>
+              <a:stCxn id="9" idx="0"/>
+              <a:endCxn id="11" idx="2"/>
+            </p:cNvCxnSpPr>
+            <p:nvPr/>
+          </p:nvCxnSpPr>
+          <p:spPr>
+            <a:xfrm flipV="1">
+              <a:off x="9325892" y="3043141"/>
+              <a:ext cx="808564" cy="576115"/>
+            </a:xfrm>
+            <a:prstGeom prst="straightConnector1">
+              <a:avLst/>
+            </a:prstGeom>
+            <a:ln w="28575">
+              <a:solidFill>
+                <a:schemeClr val="tx1"/>
+              </a:solidFill>
+              <a:headEnd w="lg" len="lg"/>
+              <a:tailEnd type="stealth" w="lg" len="lg"/>
+            </a:ln>
+          </p:spPr>
+          <p:style>
+            <a:lnRef idx="2">
+              <a:schemeClr val="accent1"/>
+            </a:lnRef>
+            <a:fillRef idx="0">
+              <a:schemeClr val="accent1"/>
+            </a:fillRef>
+            <a:effectRef idx="1">
+              <a:schemeClr val="accent1"/>
+            </a:effectRef>
+            <a:fontRef idx="minor">
+              <a:schemeClr val="tx1"/>
+            </a:fontRef>
+          </p:style>
+        </p:cxnSp>
+        <p:cxnSp>
+          <p:nvCxnSpPr>
+            <p:cNvPr id="15" name="Straight Arrow Connector 14">
+              <a:extLst>
+                <a:ext uri="{FF2B5EF4-FFF2-40B4-BE49-F238E27FC236}">
+                  <a16:creationId xmlns:a16="http://schemas.microsoft.com/office/drawing/2014/main" id="{C73D7ECB-232A-3A5C-3755-E8CA42F27EE0}"/>
+                </a:ext>
+              </a:extLst>
+            </p:cNvPr>
+            <p:cNvCxnSpPr>
+              <a:cxnSpLocks/>
+              <a:stCxn id="11" idx="2"/>
+              <a:endCxn id="13" idx="0"/>
+            </p:cNvCxnSpPr>
+            <p:nvPr/>
+          </p:nvCxnSpPr>
+          <p:spPr>
+            <a:xfrm>
+              <a:off x="10134456" y="3043141"/>
+              <a:ext cx="1015383" cy="576115"/>
+            </a:xfrm>
+            <a:prstGeom prst="straightConnector1">
+              <a:avLst/>
+            </a:prstGeom>
+            <a:ln w="28575">
+              <a:solidFill>
+                <a:schemeClr val="tx1"/>
+              </a:solidFill>
+              <a:headEnd w="lg" len="lg"/>
+              <a:tailEnd type="stealth" w="lg" len="lg"/>
+            </a:ln>
+          </p:spPr>
+          <p:style>
+            <a:lnRef idx="2">
+              <a:schemeClr val="accent1"/>
+            </a:lnRef>
+            <a:fillRef idx="0">
+              <a:schemeClr val="accent1"/>
+            </a:fillRef>
+            <a:effectRef idx="1">
+              <a:schemeClr val="accent1"/>
+            </a:effectRef>
+            <a:fontRef idx="minor">
+              <a:schemeClr val="tx1"/>
+            </a:fontRef>
+          </p:style>
+        </p:cxnSp>
+        <p:sp>
+          <p:nvSpPr>
+            <p:cNvPr id="16" name="TextBox 15">
+              <a:extLst>
+                <a:ext uri="{FF2B5EF4-FFF2-40B4-BE49-F238E27FC236}">
+                  <a16:creationId xmlns:a16="http://schemas.microsoft.com/office/drawing/2014/main" id="{003B6208-4C50-DFB6-8590-22AFF653913A}"/>
+                </a:ext>
+              </a:extLst>
+            </p:cNvPr>
+            <p:cNvSpPr txBox="1"/>
+            <p:nvPr/>
+          </p:nvSpPr>
+          <p:spPr>
+            <a:xfrm>
+              <a:off x="8442404" y="3055584"/>
+              <a:ext cx="1133644" cy="369332"/>
+            </a:xfrm>
+            <a:prstGeom prst="rect">
+              <a:avLst/>
+            </a:prstGeom>
+            <a:noFill/>
+          </p:spPr>
+          <p:txBody>
+            <a:bodyPr wrap="none" rtlCol="0">
+              <a:spAutoFit/>
+            </a:bodyPr>
+            <a:lstStyle/>
+            <a:p>
+              <a:r>
+                <a:rPr lang="en-IE" dirty="0">
+                  <a:solidFill>
+                    <a:schemeClr val="accent2">
+                      <a:lumMod val="75000"/>
+                    </a:schemeClr>
+                  </a:solidFill>
+                </a:rPr>
+                <a:t>Induction</a:t>
+              </a:r>
+            </a:p>
+          </p:txBody>
+        </p:sp>
+        <p:sp>
+          <p:nvSpPr>
+            <p:cNvPr id="19" name="TextBox 18">
+              <a:extLst>
+                <a:ext uri="{FF2B5EF4-FFF2-40B4-BE49-F238E27FC236}">
+                  <a16:creationId xmlns:a16="http://schemas.microsoft.com/office/drawing/2014/main" id="{27327A7B-8BD2-4F13-2509-F3FEF9C17D23}"/>
+                </a:ext>
+              </a:extLst>
+            </p:cNvPr>
+            <p:cNvSpPr txBox="1"/>
+            <p:nvPr/>
+          </p:nvSpPr>
+          <p:spPr>
+            <a:xfrm>
+              <a:off x="10767788" y="3050590"/>
+              <a:ext cx="1228221" cy="369332"/>
+            </a:xfrm>
+            <a:prstGeom prst="rect">
+              <a:avLst/>
+            </a:prstGeom>
+            <a:noFill/>
+          </p:spPr>
+          <p:txBody>
+            <a:bodyPr wrap="none" rtlCol="0">
+              <a:spAutoFit/>
+            </a:bodyPr>
+            <a:lstStyle/>
+            <a:p>
+              <a:r>
+                <a:rPr lang="en-IE" dirty="0">
+                  <a:solidFill>
+                    <a:schemeClr val="accent4">
+                      <a:lumMod val="50000"/>
+                    </a:schemeClr>
+                  </a:solidFill>
+                </a:rPr>
+                <a:t>Deduction</a:t>
+              </a:r>
+            </a:p>
+          </p:txBody>
+        </p:sp>
+      </p:grpSp>
+      <p:grpSp>
+        <p:nvGrpSpPr>
+          <p:cNvPr id="49" name="Group 48">
+            <a:extLst>
+              <a:ext uri="{FF2B5EF4-FFF2-40B4-BE49-F238E27FC236}">
+                <a16:creationId xmlns:a16="http://schemas.microsoft.com/office/drawing/2014/main" id="{F5037C2E-940F-82AC-5241-1A36F57627F6}"/>
+              </a:ext>
+            </a:extLst>
+          </p:cNvPr>
+          <p:cNvGrpSpPr/>
+          <p:nvPr/>
+        </p:nvGrpSpPr>
+        <p:grpSpPr>
+          <a:xfrm>
+            <a:off x="563671" y="1993403"/>
+            <a:ext cx="6636710" cy="4653617"/>
+            <a:chOff x="563671" y="1993403"/>
+            <a:chExt cx="6636710" cy="4653617"/>
+          </a:xfrm>
+        </p:grpSpPr>
+        <p:sp>
+          <p:nvSpPr>
+            <p:cNvPr id="26" name="TextBox 25">
+              <a:extLst>
+                <a:ext uri="{FF2B5EF4-FFF2-40B4-BE49-F238E27FC236}">
+                  <a16:creationId xmlns:a16="http://schemas.microsoft.com/office/drawing/2014/main" id="{BFC3C0DB-F93D-1CB1-D1AD-01E5FC898395}"/>
+                </a:ext>
+              </a:extLst>
+            </p:cNvPr>
+            <p:cNvSpPr txBox="1"/>
+            <p:nvPr/>
+          </p:nvSpPr>
+          <p:spPr>
+            <a:xfrm>
+              <a:off x="563671" y="2034927"/>
+              <a:ext cx="4427950" cy="1328023"/>
+            </a:xfrm>
+            <a:prstGeom prst="roundRect">
+              <a:avLst/>
+            </a:prstGeom>
+            <a:noFill/>
+            <a:ln>
+              <a:solidFill>
+                <a:schemeClr val="tx1"/>
+              </a:solidFill>
+            </a:ln>
+          </p:spPr>
+          <p:txBody>
+            <a:bodyPr wrap="square" rtlCol="0">
+              <a:spAutoFit/>
+            </a:bodyPr>
+            <a:lstStyle/>
+            <a:p>
+              <a:r>
+                <a:rPr lang="en-IE" dirty="0">
+                  <a:latin typeface="Proxima Nova A Light" panose="02000506030000020004" pitchFamily="2" charset="0"/>
+                </a:rPr>
+                <a:t>To be or not to be, that is the question: Whether ’tis nobler in the mind to suffer the slings and arrows of outrageous fortune,</a:t>
+              </a:r>
+            </a:p>
+          </p:txBody>
+        </p:sp>
+        <p:sp>
+          <p:nvSpPr>
+            <p:cNvPr id="27" name="TextBox 26">
+              <a:extLst>
+                <a:ext uri="{FF2B5EF4-FFF2-40B4-BE49-F238E27FC236}">
+                  <a16:creationId xmlns:a16="http://schemas.microsoft.com/office/drawing/2014/main" id="{9C66587D-8842-3E89-DB04-32872EE7B347}"/>
+                </a:ext>
+              </a:extLst>
+            </p:cNvPr>
+            <p:cNvSpPr txBox="1"/>
+            <p:nvPr/>
+          </p:nvSpPr>
+          <p:spPr>
+            <a:xfrm>
+              <a:off x="563671" y="4064563"/>
+              <a:ext cx="4427950" cy="1328023"/>
+            </a:xfrm>
+            <a:prstGeom prst="roundRect">
+              <a:avLst/>
+            </a:prstGeom>
+            <a:noFill/>
+            <a:ln>
+              <a:solidFill>
+                <a:schemeClr val="tx1"/>
+              </a:solidFill>
+            </a:ln>
+          </p:spPr>
+          <p:txBody>
+            <a:bodyPr wrap="square" rtlCol="0">
+              <a:spAutoFit/>
+            </a:bodyPr>
+            <a:lstStyle/>
+            <a:p>
+              <a:r>
+                <a:rPr lang="en-IE" dirty="0">
+                  <a:latin typeface="Proxima Nova A Light" panose="02000506030000020004" pitchFamily="2" charset="0"/>
+                </a:rPr>
+                <a:t>To be or </a:t>
+              </a:r>
+              <a:r>
+                <a:rPr lang="en-IE" dirty="0">
+                  <a:solidFill>
+                    <a:srgbClr val="FF0000"/>
+                  </a:solidFill>
+                  <a:highlight>
+                    <a:srgbClr val="FF0000"/>
+                  </a:highlight>
+                  <a:latin typeface="Proxima Nova A Light" panose="02000506030000020004" pitchFamily="2" charset="0"/>
+                </a:rPr>
+                <a:t>not</a:t>
+              </a:r>
+              <a:r>
+                <a:rPr lang="en-IE" dirty="0">
+                  <a:latin typeface="Proxima Nova A Light" panose="02000506030000020004" pitchFamily="2" charset="0"/>
+                </a:rPr>
+                <a:t> to be, that is the question: Whether ’tis </a:t>
+              </a:r>
+              <a:r>
+                <a:rPr lang="en-IE" dirty="0">
+                  <a:solidFill>
+                    <a:srgbClr val="FF0000"/>
+                  </a:solidFill>
+                  <a:highlight>
+                    <a:srgbClr val="FF0000"/>
+                  </a:highlight>
+                  <a:latin typeface="Proxima Nova A Light" panose="02000506030000020004" pitchFamily="2" charset="0"/>
+                </a:rPr>
+                <a:t>nobler</a:t>
+              </a:r>
+              <a:r>
+                <a:rPr lang="en-IE" dirty="0">
+                  <a:latin typeface="Proxima Nova A Light" panose="02000506030000020004" pitchFamily="2" charset="0"/>
+                </a:rPr>
+                <a:t> in the </a:t>
+              </a:r>
+              <a:r>
+                <a:rPr lang="en-IE" dirty="0">
+                  <a:solidFill>
+                    <a:srgbClr val="FF0000"/>
+                  </a:solidFill>
+                  <a:highlight>
+                    <a:srgbClr val="FF0000"/>
+                  </a:highlight>
+                  <a:latin typeface="Proxima Nova A Light" panose="02000506030000020004" pitchFamily="2" charset="0"/>
+                </a:rPr>
+                <a:t>mind</a:t>
+              </a:r>
+              <a:r>
+                <a:rPr lang="en-IE" dirty="0">
+                  <a:latin typeface="Proxima Nova A Light" panose="02000506030000020004" pitchFamily="2" charset="0"/>
+                </a:rPr>
+                <a:t> to suffer the slings and arrows of </a:t>
+              </a:r>
+              <a:r>
+                <a:rPr lang="en-IE" dirty="0">
+                  <a:solidFill>
+                    <a:srgbClr val="FF0000"/>
+                  </a:solidFill>
+                  <a:highlight>
+                    <a:srgbClr val="FF0000"/>
+                  </a:highlight>
+                  <a:latin typeface="Proxima Nova A Light" panose="02000506030000020004" pitchFamily="2" charset="0"/>
+                </a:rPr>
+                <a:t>outrageous</a:t>
+              </a:r>
+              <a:r>
+                <a:rPr lang="en-IE" dirty="0">
+                  <a:latin typeface="Proxima Nova A Light" panose="02000506030000020004" pitchFamily="2" charset="0"/>
+                </a:rPr>
+                <a:t> fortune,</a:t>
+              </a:r>
+            </a:p>
+          </p:txBody>
+        </p:sp>
+        <p:cxnSp>
+          <p:nvCxnSpPr>
+            <p:cNvPr id="29" name="Straight Arrow Connector 28">
+              <a:extLst>
+                <a:ext uri="{FF2B5EF4-FFF2-40B4-BE49-F238E27FC236}">
+                  <a16:creationId xmlns:a16="http://schemas.microsoft.com/office/drawing/2014/main" id="{23C0BBD2-D15E-6C15-B400-DEC33A41028E}"/>
+                </a:ext>
+              </a:extLst>
+            </p:cNvPr>
+            <p:cNvCxnSpPr>
+              <a:stCxn id="26" idx="2"/>
+              <a:endCxn id="27" idx="0"/>
+            </p:cNvCxnSpPr>
+            <p:nvPr/>
+          </p:nvCxnSpPr>
+          <p:spPr>
+            <a:xfrm>
+              <a:off x="2777646" y="3362950"/>
+              <a:ext cx="0" cy="701613"/>
+            </a:xfrm>
+            <a:prstGeom prst="straightConnector1">
+              <a:avLst/>
+            </a:prstGeom>
+            <a:ln w="19050">
+              <a:solidFill>
+                <a:schemeClr val="tx1"/>
+              </a:solidFill>
+              <a:tailEnd type="stealth" w="lg" len="lg"/>
+            </a:ln>
+          </p:spPr>
+          <p:style>
+            <a:lnRef idx="2">
+              <a:schemeClr val="accent1"/>
+            </a:lnRef>
+            <a:fillRef idx="0">
+              <a:schemeClr val="accent1"/>
+            </a:fillRef>
+            <a:effectRef idx="1">
+              <a:schemeClr val="accent1"/>
+            </a:effectRef>
+            <a:fontRef idx="minor">
+              <a:schemeClr val="tx1"/>
+            </a:fontRef>
+          </p:style>
+        </p:cxnSp>
+        <p:sp>
+          <p:nvSpPr>
+            <p:cNvPr id="30" name="TextBox 29">
+              <a:extLst>
+                <a:ext uri="{FF2B5EF4-FFF2-40B4-BE49-F238E27FC236}">
+                  <a16:creationId xmlns:a16="http://schemas.microsoft.com/office/drawing/2014/main" id="{6BD667A3-4FF7-4CA9-812A-AEFBEB323CC5}"/>
+                </a:ext>
+              </a:extLst>
+            </p:cNvPr>
+            <p:cNvSpPr txBox="1"/>
+            <p:nvPr/>
+          </p:nvSpPr>
+          <p:spPr>
+            <a:xfrm>
+              <a:off x="2832554" y="3522523"/>
+              <a:ext cx="2218043" cy="369332"/>
+            </a:xfrm>
+            <a:prstGeom prst="rect">
+              <a:avLst/>
+            </a:prstGeom>
+            <a:noFill/>
+          </p:spPr>
+          <p:txBody>
+            <a:bodyPr wrap="none" rtlCol="0">
+              <a:spAutoFit/>
+            </a:bodyPr>
+            <a:lstStyle/>
+            <a:p>
+              <a:r>
+                <a:rPr lang="en-IE" dirty="0"/>
+                <a:t>Mask words (tokens)</a:t>
+              </a:r>
+            </a:p>
+          </p:txBody>
+        </p:sp>
+        <p:pic>
+          <p:nvPicPr>
+            <p:cNvPr id="31" name="Graphic 30" descr="Robot outline">
+              <a:extLst>
+                <a:ext uri="{FF2B5EF4-FFF2-40B4-BE49-F238E27FC236}">
+                  <a16:creationId xmlns:a16="http://schemas.microsoft.com/office/drawing/2014/main" id="{CD1C25DD-0494-7156-31C9-810A09BF2B5A}"/>
+                </a:ext>
+              </a:extLst>
+            </p:cNvPr>
+            <p:cNvPicPr>
+              <a:picLocks noChangeAspect="1"/>
+            </p:cNvPicPr>
+            <p:nvPr/>
+          </p:nvPicPr>
+          <p:blipFill>
+            <a:blip r:embed="rId4">
+              <a:extLst>
+                <a:ext uri="{96DAC541-7B7A-43D3-8B79-37D633B846F1}">
+                  <asvg:svgBlip xmlns:asvg="http://schemas.microsoft.com/office/drawing/2016/SVG/main" r:embed="rId5"/>
+                </a:ext>
+              </a:extLst>
+            </a:blip>
+            <a:stretch>
+              <a:fillRect/>
+            </a:stretch>
+          </p:blipFill>
+          <p:spPr>
+            <a:xfrm>
+              <a:off x="5486398" y="2955244"/>
+              <a:ext cx="1328023" cy="1328023"/>
+            </a:xfrm>
+            <a:prstGeom prst="rect">
+              <a:avLst/>
+            </a:prstGeom>
+          </p:spPr>
+        </p:pic>
+        <p:cxnSp>
+          <p:nvCxnSpPr>
+            <p:cNvPr id="33" name="Elbow Connector 32">
+              <a:extLst>
+                <a:ext uri="{FF2B5EF4-FFF2-40B4-BE49-F238E27FC236}">
+                  <a16:creationId xmlns:a16="http://schemas.microsoft.com/office/drawing/2014/main" id="{DF5976B2-0CF5-37BC-0EA8-D095225977E7}"/>
+                </a:ext>
+              </a:extLst>
+            </p:cNvPr>
+            <p:cNvCxnSpPr>
+              <a:stCxn id="27" idx="3"/>
+              <a:endCxn id="31" idx="2"/>
+            </p:cNvCxnSpPr>
+            <p:nvPr/>
+          </p:nvCxnSpPr>
+          <p:spPr>
+            <a:xfrm flipV="1">
+              <a:off x="4991621" y="4283267"/>
+              <a:ext cx="1158789" cy="445308"/>
+            </a:xfrm>
+            <a:prstGeom prst="bentConnector2">
+              <a:avLst/>
+            </a:prstGeom>
+            <a:ln>
+              <a:solidFill>
+                <a:schemeClr val="tx1"/>
+              </a:solidFill>
+              <a:tailEnd type="stealth" w="lg" len="lg"/>
+            </a:ln>
+          </p:spPr>
+          <p:style>
+            <a:lnRef idx="2">
+              <a:schemeClr val="accent1"/>
+            </a:lnRef>
+            <a:fillRef idx="0">
+              <a:schemeClr val="accent1"/>
+            </a:fillRef>
+            <a:effectRef idx="1">
+              <a:schemeClr val="accent1"/>
+            </a:effectRef>
+            <a:fontRef idx="minor">
+              <a:schemeClr val="tx1"/>
+            </a:fontRef>
+          </p:style>
+        </p:cxnSp>
+        <p:cxnSp>
+          <p:nvCxnSpPr>
+            <p:cNvPr id="34" name="Elbow Connector 33">
+              <a:extLst>
+                <a:ext uri="{FF2B5EF4-FFF2-40B4-BE49-F238E27FC236}">
+                  <a16:creationId xmlns:a16="http://schemas.microsoft.com/office/drawing/2014/main" id="{D3DEEDBA-CA68-9AD2-7184-F4E52BF69FE2}"/>
+                </a:ext>
+              </a:extLst>
+            </p:cNvPr>
+            <p:cNvCxnSpPr>
+              <a:cxnSpLocks/>
+              <a:stCxn id="31" idx="0"/>
+              <a:endCxn id="26" idx="3"/>
+            </p:cNvCxnSpPr>
+            <p:nvPr/>
+          </p:nvCxnSpPr>
+          <p:spPr>
+            <a:xfrm rot="16200000" flipV="1">
+              <a:off x="5442864" y="2247697"/>
+              <a:ext cx="256305" cy="1158789"/>
+            </a:xfrm>
+            <a:prstGeom prst="bentConnector2">
+              <a:avLst/>
+            </a:prstGeom>
+            <a:ln>
+              <a:solidFill>
+                <a:schemeClr val="tx1"/>
+              </a:solidFill>
+              <a:tailEnd type="stealth" w="lg" len="lg"/>
+            </a:ln>
+          </p:spPr>
+          <p:style>
+            <a:lnRef idx="2">
+              <a:schemeClr val="accent1"/>
+            </a:lnRef>
+            <a:fillRef idx="0">
+              <a:schemeClr val="accent1"/>
+            </a:fillRef>
+            <a:effectRef idx="1">
+              <a:schemeClr val="accent1"/>
+            </a:effectRef>
+            <a:fontRef idx="minor">
+              <a:schemeClr val="tx1"/>
+            </a:fontRef>
+          </p:style>
+        </p:cxnSp>
+        <p:sp>
+          <p:nvSpPr>
+            <p:cNvPr id="37" name="TextBox 36">
+              <a:extLst>
+                <a:ext uri="{FF2B5EF4-FFF2-40B4-BE49-F238E27FC236}">
+                  <a16:creationId xmlns:a16="http://schemas.microsoft.com/office/drawing/2014/main" id="{1A33CCAF-E890-EF63-85FD-E225095F3D04}"/>
+                </a:ext>
+              </a:extLst>
+            </p:cNvPr>
+            <p:cNvSpPr txBox="1"/>
+            <p:nvPr/>
+          </p:nvSpPr>
+          <p:spPr>
+            <a:xfrm>
+              <a:off x="5165166" y="1993403"/>
+              <a:ext cx="2035215" cy="646331"/>
+            </a:xfrm>
+            <a:prstGeom prst="rect">
+              <a:avLst/>
+            </a:prstGeom>
+            <a:noFill/>
+          </p:spPr>
+          <p:txBody>
+            <a:bodyPr wrap="square" rtlCol="0">
+              <a:spAutoFit/>
+            </a:bodyPr>
+            <a:lstStyle/>
+            <a:p>
+              <a:r>
+                <a:rPr lang="en-IE" dirty="0"/>
+                <a:t>Reconstruct original sentence</a:t>
+              </a:r>
+            </a:p>
+          </p:txBody>
+        </p:sp>
+        <p:sp>
+          <p:nvSpPr>
+            <p:cNvPr id="38" name="TextBox 37">
+              <a:extLst>
+                <a:ext uri="{FF2B5EF4-FFF2-40B4-BE49-F238E27FC236}">
+                  <a16:creationId xmlns:a16="http://schemas.microsoft.com/office/drawing/2014/main" id="{02EB5667-A217-7534-CFD3-8C9DB8816ADF}"/>
+                </a:ext>
+              </a:extLst>
+            </p:cNvPr>
+            <p:cNvSpPr txBox="1"/>
+            <p:nvPr/>
+          </p:nvSpPr>
+          <p:spPr>
+            <a:xfrm>
+              <a:off x="5130029" y="4787138"/>
+              <a:ext cx="1249125" cy="369332"/>
+            </a:xfrm>
+            <a:prstGeom prst="rect">
+              <a:avLst/>
+            </a:prstGeom>
+            <a:noFill/>
+          </p:spPr>
+          <p:txBody>
+            <a:bodyPr wrap="none" rtlCol="0">
+              <a:spAutoFit/>
+            </a:bodyPr>
+            <a:lstStyle/>
+            <a:p>
+              <a:r>
+                <a:rPr lang="en-IE" dirty="0"/>
+                <a:t>p(w | T-{w})</a:t>
+              </a:r>
+            </a:p>
+          </p:txBody>
+        </p:sp>
+        <p:cxnSp>
+          <p:nvCxnSpPr>
+            <p:cNvPr id="39" name="Straight Arrow Connector 38">
+              <a:extLst>
+                <a:ext uri="{FF2B5EF4-FFF2-40B4-BE49-F238E27FC236}">
+                  <a16:creationId xmlns:a16="http://schemas.microsoft.com/office/drawing/2014/main" id="{8B4E3A88-143E-27E3-D2A6-CBE0F5D0BB09}"/>
+                </a:ext>
+              </a:extLst>
+            </p:cNvPr>
+            <p:cNvCxnSpPr>
+              <a:cxnSpLocks/>
+              <a:stCxn id="38" idx="2"/>
+              <a:endCxn id="40" idx="0"/>
+            </p:cNvCxnSpPr>
+            <p:nvPr/>
+          </p:nvCxnSpPr>
+          <p:spPr>
+            <a:xfrm flipH="1">
+              <a:off x="5754591" y="5156470"/>
+              <a:ext cx="1" cy="567220"/>
+            </a:xfrm>
+            <a:prstGeom prst="straightConnector1">
+              <a:avLst/>
+            </a:prstGeom>
+            <a:ln w="19050">
+              <a:solidFill>
+                <a:schemeClr val="tx1"/>
+              </a:solidFill>
+              <a:tailEnd type="stealth" w="lg" len="lg"/>
+            </a:ln>
+          </p:spPr>
+          <p:style>
+            <a:lnRef idx="2">
+              <a:schemeClr val="accent1"/>
+            </a:lnRef>
+            <a:fillRef idx="0">
+              <a:schemeClr val="accent1"/>
+            </a:fillRef>
+            <a:effectRef idx="1">
+              <a:schemeClr val="accent1"/>
+            </a:effectRef>
+            <a:fontRef idx="minor">
+              <a:schemeClr val="tx1"/>
+            </a:fontRef>
+          </p:style>
+        </p:cxnSp>
+        <p:sp>
+          <p:nvSpPr>
+            <p:cNvPr id="40" name="TextBox 39">
+              <a:extLst>
+                <a:ext uri="{FF2B5EF4-FFF2-40B4-BE49-F238E27FC236}">
+                  <a16:creationId xmlns:a16="http://schemas.microsoft.com/office/drawing/2014/main" id="{783816DB-CF9A-90AD-E6E5-A7C84F34F6E2}"/>
+                </a:ext>
+              </a:extLst>
+            </p:cNvPr>
+            <p:cNvSpPr txBox="1"/>
+            <p:nvPr/>
+          </p:nvSpPr>
+          <p:spPr>
+            <a:xfrm>
+              <a:off x="4467276" y="5723690"/>
+              <a:ext cx="2574629" cy="923330"/>
+            </a:xfrm>
+            <a:prstGeom prst="rect">
+              <a:avLst/>
+            </a:prstGeom>
+            <a:noFill/>
+          </p:spPr>
+          <p:txBody>
+            <a:bodyPr wrap="square" rtlCol="0">
+              <a:spAutoFit/>
+            </a:bodyPr>
+            <a:lstStyle/>
+            <a:p>
+              <a:r>
+                <a:rPr lang="en-IE" dirty="0"/>
+                <a:t>Conditional probability of word (</a:t>
+              </a:r>
+              <a:r>
+                <a:rPr lang="en-IE" i="1" dirty="0"/>
+                <a:t>w</a:t>
+              </a:r>
+              <a:r>
+                <a:rPr lang="en-IE" dirty="0"/>
+                <a:t>), given the rest of the text (</a:t>
+              </a:r>
+              <a:r>
+                <a:rPr lang="en-IE" i="1" dirty="0"/>
+                <a:t>T</a:t>
+              </a:r>
+              <a:r>
+                <a:rPr lang="en-IE" dirty="0"/>
+                <a:t>)</a:t>
+              </a:r>
+            </a:p>
+          </p:txBody>
+        </p:sp>
+      </p:grpSp>
+    </p:spTree>
+    <p:extLst>
+      <p:ext uri="{BB962C8B-B14F-4D97-AF65-F5344CB8AC3E}">
+        <p14:creationId xmlns:p14="http://schemas.microsoft.com/office/powerpoint/2010/main" val="3446657799"/>
+      </p:ext>
+    </p:extLst>
+  </p:cSld>
+  <p:clrMapOvr>
+    <a:masterClrMapping/>
+  </p:clrMapOvr>
+</p:sld>
+</file>
+
+<file path=ppt/slides/slide11.xml><?xml version="1.0" encoding="utf-8"?>
 <p:sld xmlns:a="http://schemas.openxmlformats.org/drawingml/2006/main" xmlns:r="http://schemas.openxmlformats.org/officeDocument/2006/relationships" xmlns:p="http://schemas.openxmlformats.org/presentationml/2006/main">
   <p:cSld>
     <p:spTree>
@@ -4954,7 +6032,7 @@
 </p:sld>
 </file>
 
-<file path=ppt/slides/slide11.xml><?xml version="1.0" encoding="utf-8"?>
+<file path=ppt/slides/slide12.xml><?xml version="1.0" encoding="utf-8"?>
 <p:sld xmlns:a="http://schemas.openxmlformats.org/drawingml/2006/main" xmlns:r="http://schemas.openxmlformats.org/officeDocument/2006/relationships" xmlns:p="http://schemas.openxmlformats.org/presentationml/2006/main">
   <p:cSld>
     <p:spTree>
@@ -4976,6 +6054,1106 @@
           <p:cNvPr id="2" name="Title 1">
             <a:extLst>
               <a:ext uri="{FF2B5EF4-FFF2-40B4-BE49-F238E27FC236}">
+                <a16:creationId xmlns:a16="http://schemas.microsoft.com/office/drawing/2014/main" id="{1DBE7CA1-BAEE-190F-1308-69D430699C19}"/>
+              </a:ext>
+            </a:extLst>
+          </p:cNvPr>
+          <p:cNvSpPr>
+            <a:spLocks noGrp="1"/>
+          </p:cNvSpPr>
+          <p:nvPr>
+            <p:ph type="title"/>
+          </p:nvPr>
+        </p:nvSpPr>
+        <p:spPr/>
+        <p:txBody>
+          <a:bodyPr/>
+          <a:lstStyle/>
+          <a:p>
+            <a:r>
+              <a:rPr lang="en-IE" dirty="0"/>
+              <a:t>Concepts as vectors</a:t>
+            </a:r>
+          </a:p>
+        </p:txBody>
+      </p:sp>
+      <p:cxnSp>
+        <p:nvCxnSpPr>
+          <p:cNvPr id="5" name="Straight Arrow Connector 4">
+            <a:extLst>
+              <a:ext uri="{FF2B5EF4-FFF2-40B4-BE49-F238E27FC236}">
+                <a16:creationId xmlns:a16="http://schemas.microsoft.com/office/drawing/2014/main" id="{D67FC560-A74B-2ABE-B425-1954A9FE7BD4}"/>
+              </a:ext>
+            </a:extLst>
+          </p:cNvPr>
+          <p:cNvCxnSpPr>
+            <a:cxnSpLocks/>
+            <a:endCxn id="6" idx="4"/>
+          </p:cNvCxnSpPr>
+          <p:nvPr/>
+        </p:nvCxnSpPr>
+        <p:spPr>
+          <a:xfrm flipV="1">
+            <a:off x="2488019" y="3104706"/>
+            <a:ext cx="983511" cy="2009554"/>
+          </a:xfrm>
+          <a:prstGeom prst="straightConnector1">
+            <a:avLst/>
+          </a:prstGeom>
+          <a:ln w="38100">
+            <a:tailEnd type="triangle"/>
+          </a:ln>
+        </p:spPr>
+        <p:style>
+          <a:lnRef idx="2">
+            <a:schemeClr val="accent1"/>
+          </a:lnRef>
+          <a:fillRef idx="0">
+            <a:schemeClr val="accent1"/>
+          </a:fillRef>
+          <a:effectRef idx="1">
+            <a:schemeClr val="accent1"/>
+          </a:effectRef>
+          <a:fontRef idx="minor">
+            <a:schemeClr val="tx1"/>
+          </a:fontRef>
+        </p:style>
+      </p:cxnSp>
+      <p:sp>
+        <p:nvSpPr>
+          <p:cNvPr id="6" name="Oval 5">
+            <a:extLst>
+              <a:ext uri="{FF2B5EF4-FFF2-40B4-BE49-F238E27FC236}">
+                <a16:creationId xmlns:a16="http://schemas.microsoft.com/office/drawing/2014/main" id="{03E48148-3E49-3A2C-875F-F579A3D64ED6}"/>
+              </a:ext>
+            </a:extLst>
+          </p:cNvPr>
+          <p:cNvSpPr/>
+          <p:nvPr/>
+        </p:nvSpPr>
+        <p:spPr>
+          <a:xfrm>
+            <a:off x="3264195" y="2690037"/>
+            <a:ext cx="414670" cy="414669"/>
+          </a:xfrm>
+          <a:prstGeom prst="ellipse">
+            <a:avLst/>
+          </a:prstGeom>
+        </p:spPr>
+        <p:style>
+          <a:lnRef idx="2">
+            <a:schemeClr val="accent1">
+              <a:shade val="15000"/>
+            </a:schemeClr>
+          </a:lnRef>
+          <a:fillRef idx="1">
+            <a:schemeClr val="accent1"/>
+          </a:fillRef>
+          <a:effectRef idx="0">
+            <a:schemeClr val="accent1"/>
+          </a:effectRef>
+          <a:fontRef idx="minor">
+            <a:schemeClr val="lt1"/>
+          </a:fontRef>
+        </p:style>
+        <p:txBody>
+          <a:bodyPr rtlCol="0" anchor="ctr"/>
+          <a:lstStyle/>
+          <a:p>
+            <a:pPr algn="ctr"/>
+            <a:endParaRPr lang="en-IE"/>
+          </a:p>
+        </p:txBody>
+      </p:sp>
+      <p:sp>
+        <p:nvSpPr>
+          <p:cNvPr id="9" name="TextBox 8">
+            <a:extLst>
+              <a:ext uri="{FF2B5EF4-FFF2-40B4-BE49-F238E27FC236}">
+                <a16:creationId xmlns:a16="http://schemas.microsoft.com/office/drawing/2014/main" id="{D0948B4C-504D-86EA-DB4F-C2EEBBF6F324}"/>
+              </a:ext>
+            </a:extLst>
+          </p:cNvPr>
+          <p:cNvSpPr txBox="1"/>
+          <p:nvPr/>
+        </p:nvSpPr>
+        <p:spPr>
+          <a:xfrm>
+            <a:off x="3264195" y="2298037"/>
+            <a:ext cx="617477" cy="369332"/>
+          </a:xfrm>
+          <a:prstGeom prst="rect">
+            <a:avLst/>
+          </a:prstGeom>
+          <a:noFill/>
+        </p:spPr>
+        <p:txBody>
+          <a:bodyPr wrap="none" rtlCol="0">
+            <a:spAutoFit/>
+          </a:bodyPr>
+          <a:lstStyle/>
+          <a:p>
+            <a:r>
+              <a:rPr lang="en-IE" dirty="0"/>
+              <a:t>Man</a:t>
+            </a:r>
+          </a:p>
+        </p:txBody>
+      </p:sp>
+      <p:sp>
+        <p:nvSpPr>
+          <p:cNvPr id="10" name="Oval 9">
+            <a:extLst>
+              <a:ext uri="{FF2B5EF4-FFF2-40B4-BE49-F238E27FC236}">
+                <a16:creationId xmlns:a16="http://schemas.microsoft.com/office/drawing/2014/main" id="{44EC3C21-FC7B-C034-A66D-6C08F9C5049F}"/>
+              </a:ext>
+            </a:extLst>
+          </p:cNvPr>
+          <p:cNvSpPr/>
+          <p:nvPr/>
+        </p:nvSpPr>
+        <p:spPr>
+          <a:xfrm rot="1521496">
+            <a:off x="4862623" y="3902148"/>
+            <a:ext cx="414670" cy="414669"/>
+          </a:xfrm>
+          <a:prstGeom prst="ellipse">
+            <a:avLst/>
+          </a:prstGeom>
+          <a:solidFill>
+            <a:schemeClr val="accent2"/>
+          </a:solidFill>
+        </p:spPr>
+        <p:style>
+          <a:lnRef idx="2">
+            <a:schemeClr val="accent1">
+              <a:shade val="15000"/>
+            </a:schemeClr>
+          </a:lnRef>
+          <a:fillRef idx="1">
+            <a:schemeClr val="accent1"/>
+          </a:fillRef>
+          <a:effectRef idx="0">
+            <a:schemeClr val="accent1"/>
+          </a:effectRef>
+          <a:fontRef idx="minor">
+            <a:schemeClr val="lt1"/>
+          </a:fontRef>
+        </p:style>
+        <p:txBody>
+          <a:bodyPr rtlCol="0" anchor="ctr"/>
+          <a:lstStyle/>
+          <a:p>
+            <a:pPr algn="ctr"/>
+            <a:endParaRPr lang="en-IE"/>
+          </a:p>
+        </p:txBody>
+      </p:sp>
+      <p:sp>
+        <p:nvSpPr>
+          <p:cNvPr id="11" name="TextBox 10">
+            <a:extLst>
+              <a:ext uri="{FF2B5EF4-FFF2-40B4-BE49-F238E27FC236}">
+                <a16:creationId xmlns:a16="http://schemas.microsoft.com/office/drawing/2014/main" id="{2E7CC153-E97F-665B-6443-55CDF843B954}"/>
+              </a:ext>
+            </a:extLst>
+          </p:cNvPr>
+          <p:cNvSpPr txBox="1"/>
+          <p:nvPr/>
+        </p:nvSpPr>
+        <p:spPr>
+          <a:xfrm>
+            <a:off x="4590980" y="3487479"/>
+            <a:ext cx="957955" cy="369332"/>
+          </a:xfrm>
+          <a:prstGeom prst="rect">
+            <a:avLst/>
+          </a:prstGeom>
+          <a:noFill/>
+        </p:spPr>
+        <p:txBody>
+          <a:bodyPr wrap="none" rtlCol="0">
+            <a:spAutoFit/>
+          </a:bodyPr>
+          <a:lstStyle/>
+          <a:p>
+            <a:r>
+              <a:rPr lang="en-IE" dirty="0"/>
+              <a:t>Woman</a:t>
+            </a:r>
+          </a:p>
+        </p:txBody>
+      </p:sp>
+      <p:cxnSp>
+        <p:nvCxnSpPr>
+          <p:cNvPr id="12" name="Straight Arrow Connector 11">
+            <a:extLst>
+              <a:ext uri="{FF2B5EF4-FFF2-40B4-BE49-F238E27FC236}">
+                <a16:creationId xmlns:a16="http://schemas.microsoft.com/office/drawing/2014/main" id="{78A753BA-477C-F2A7-A095-EB8A4367E239}"/>
+              </a:ext>
+            </a:extLst>
+          </p:cNvPr>
+          <p:cNvCxnSpPr>
+            <a:cxnSpLocks/>
+            <a:endCxn id="10" idx="3"/>
+          </p:cNvCxnSpPr>
+          <p:nvPr/>
+        </p:nvCxnSpPr>
+        <p:spPr>
+          <a:xfrm flipV="1">
+            <a:off x="2488019" y="4179175"/>
+            <a:ext cx="2386668" cy="935085"/>
+          </a:xfrm>
+          <a:prstGeom prst="straightConnector1">
+            <a:avLst/>
+          </a:prstGeom>
+          <a:ln w="38100">
+            <a:solidFill>
+              <a:schemeClr val="accent2"/>
+            </a:solidFill>
+            <a:tailEnd type="triangle"/>
+          </a:ln>
+        </p:spPr>
+        <p:style>
+          <a:lnRef idx="2">
+            <a:schemeClr val="accent1"/>
+          </a:lnRef>
+          <a:fillRef idx="0">
+            <a:schemeClr val="accent1"/>
+          </a:fillRef>
+          <a:effectRef idx="1">
+            <a:schemeClr val="accent1"/>
+          </a:effectRef>
+          <a:fontRef idx="minor">
+            <a:schemeClr val="tx1"/>
+          </a:fontRef>
+        </p:style>
+      </p:cxnSp>
+    </p:spTree>
+    <p:extLst>
+      <p:ext uri="{BB962C8B-B14F-4D97-AF65-F5344CB8AC3E}">
+        <p14:creationId xmlns:p14="http://schemas.microsoft.com/office/powerpoint/2010/main" val="175939292"/>
+      </p:ext>
+    </p:extLst>
+  </p:cSld>
+  <p:clrMapOvr>
+    <a:masterClrMapping/>
+  </p:clrMapOvr>
+</p:sld>
+</file>
+
+<file path=ppt/slides/slide13.xml><?xml version="1.0" encoding="utf-8"?>
+<p:sld xmlns:a="http://schemas.openxmlformats.org/drawingml/2006/main" xmlns:r="http://schemas.openxmlformats.org/officeDocument/2006/relationships" xmlns:p="http://schemas.openxmlformats.org/presentationml/2006/main">
+  <p:cSld>
+    <p:spTree>
+      <p:nvGrpSpPr>
+        <p:cNvPr id="1" name="">
+          <a:extLst>
+            <a:ext uri="{FF2B5EF4-FFF2-40B4-BE49-F238E27FC236}">
+              <a16:creationId xmlns:a16="http://schemas.microsoft.com/office/drawing/2014/main" id="{CE23CB56-6961-C597-2E1F-08A54599D853}"/>
+            </a:ext>
+          </a:extLst>
+        </p:cNvPr>
+        <p:cNvGrpSpPr/>
+        <p:nvPr/>
+      </p:nvGrpSpPr>
+      <p:grpSpPr>
+        <a:xfrm>
+          <a:off x="0" y="0"/>
+          <a:ext cx="0" cy="0"/>
+          <a:chOff x="0" y="0"/>
+          <a:chExt cx="0" cy="0"/>
+        </a:xfrm>
+      </p:grpSpPr>
+      <p:sp>
+        <p:nvSpPr>
+          <p:cNvPr id="2" name="Title 1">
+            <a:extLst>
+              <a:ext uri="{FF2B5EF4-FFF2-40B4-BE49-F238E27FC236}">
+                <a16:creationId xmlns:a16="http://schemas.microsoft.com/office/drawing/2014/main" id="{5D5DE429-5CF7-B1E1-012D-9EEED7A75E91}"/>
+              </a:ext>
+            </a:extLst>
+          </p:cNvPr>
+          <p:cNvSpPr>
+            <a:spLocks noGrp="1"/>
+          </p:cNvSpPr>
+          <p:nvPr>
+            <p:ph type="title"/>
+          </p:nvPr>
+        </p:nvSpPr>
+        <p:spPr/>
+        <p:txBody>
+          <a:bodyPr/>
+          <a:lstStyle/>
+          <a:p>
+            <a:r>
+              <a:rPr lang="en-IE" dirty="0"/>
+              <a:t>Concepts as vectors</a:t>
+            </a:r>
+          </a:p>
+        </p:txBody>
+      </p:sp>
+      <p:cxnSp>
+        <p:nvCxnSpPr>
+          <p:cNvPr id="5" name="Straight Arrow Connector 4">
+            <a:extLst>
+              <a:ext uri="{FF2B5EF4-FFF2-40B4-BE49-F238E27FC236}">
+                <a16:creationId xmlns:a16="http://schemas.microsoft.com/office/drawing/2014/main" id="{EC23E1AB-F3AD-4C32-596C-AC59C7A4ECE7}"/>
+              </a:ext>
+            </a:extLst>
+          </p:cNvPr>
+          <p:cNvCxnSpPr>
+            <a:cxnSpLocks/>
+            <a:endCxn id="6" idx="4"/>
+          </p:cNvCxnSpPr>
+          <p:nvPr/>
+        </p:nvCxnSpPr>
+        <p:spPr>
+          <a:xfrm flipV="1">
+            <a:off x="2488019" y="3104706"/>
+            <a:ext cx="983511" cy="2009554"/>
+          </a:xfrm>
+          <a:prstGeom prst="straightConnector1">
+            <a:avLst/>
+          </a:prstGeom>
+          <a:ln w="38100">
+            <a:tailEnd type="triangle"/>
+          </a:ln>
+        </p:spPr>
+        <p:style>
+          <a:lnRef idx="2">
+            <a:schemeClr val="accent1"/>
+          </a:lnRef>
+          <a:fillRef idx="0">
+            <a:schemeClr val="accent1"/>
+          </a:fillRef>
+          <a:effectRef idx="1">
+            <a:schemeClr val="accent1"/>
+          </a:effectRef>
+          <a:fontRef idx="minor">
+            <a:schemeClr val="tx1"/>
+          </a:fontRef>
+        </p:style>
+      </p:cxnSp>
+      <p:sp>
+        <p:nvSpPr>
+          <p:cNvPr id="6" name="Oval 5">
+            <a:extLst>
+              <a:ext uri="{FF2B5EF4-FFF2-40B4-BE49-F238E27FC236}">
+                <a16:creationId xmlns:a16="http://schemas.microsoft.com/office/drawing/2014/main" id="{AF1997BA-332B-5474-9401-3829EF338033}"/>
+              </a:ext>
+            </a:extLst>
+          </p:cNvPr>
+          <p:cNvSpPr/>
+          <p:nvPr/>
+        </p:nvSpPr>
+        <p:spPr>
+          <a:xfrm>
+            <a:off x="3264195" y="2690037"/>
+            <a:ext cx="414670" cy="414669"/>
+          </a:xfrm>
+          <a:prstGeom prst="ellipse">
+            <a:avLst/>
+          </a:prstGeom>
+        </p:spPr>
+        <p:style>
+          <a:lnRef idx="2">
+            <a:schemeClr val="accent1">
+              <a:shade val="15000"/>
+            </a:schemeClr>
+          </a:lnRef>
+          <a:fillRef idx="1">
+            <a:schemeClr val="accent1"/>
+          </a:fillRef>
+          <a:effectRef idx="0">
+            <a:schemeClr val="accent1"/>
+          </a:effectRef>
+          <a:fontRef idx="minor">
+            <a:schemeClr val="lt1"/>
+          </a:fontRef>
+        </p:style>
+        <p:txBody>
+          <a:bodyPr rtlCol="0" anchor="ctr"/>
+          <a:lstStyle/>
+          <a:p>
+            <a:pPr algn="ctr"/>
+            <a:endParaRPr lang="en-IE"/>
+          </a:p>
+        </p:txBody>
+      </p:sp>
+      <p:sp>
+        <p:nvSpPr>
+          <p:cNvPr id="9" name="TextBox 8">
+            <a:extLst>
+              <a:ext uri="{FF2B5EF4-FFF2-40B4-BE49-F238E27FC236}">
+                <a16:creationId xmlns:a16="http://schemas.microsoft.com/office/drawing/2014/main" id="{E38CB65E-7BF1-AADA-3997-B1F220FB80FF}"/>
+              </a:ext>
+            </a:extLst>
+          </p:cNvPr>
+          <p:cNvSpPr txBox="1"/>
+          <p:nvPr/>
+        </p:nvSpPr>
+        <p:spPr>
+          <a:xfrm>
+            <a:off x="3264195" y="2298037"/>
+            <a:ext cx="617477" cy="369332"/>
+          </a:xfrm>
+          <a:prstGeom prst="rect">
+            <a:avLst/>
+          </a:prstGeom>
+          <a:noFill/>
+        </p:spPr>
+        <p:txBody>
+          <a:bodyPr wrap="none" rtlCol="0">
+            <a:spAutoFit/>
+          </a:bodyPr>
+          <a:lstStyle/>
+          <a:p>
+            <a:r>
+              <a:rPr lang="en-IE" dirty="0"/>
+              <a:t>Man</a:t>
+            </a:r>
+          </a:p>
+        </p:txBody>
+      </p:sp>
+      <p:sp>
+        <p:nvSpPr>
+          <p:cNvPr id="10" name="Oval 9">
+            <a:extLst>
+              <a:ext uri="{FF2B5EF4-FFF2-40B4-BE49-F238E27FC236}">
+                <a16:creationId xmlns:a16="http://schemas.microsoft.com/office/drawing/2014/main" id="{963CECA5-F4F9-71A8-4BF9-5C613A451E50}"/>
+              </a:ext>
+            </a:extLst>
+          </p:cNvPr>
+          <p:cNvSpPr/>
+          <p:nvPr/>
+        </p:nvSpPr>
+        <p:spPr>
+          <a:xfrm rot="1521496">
+            <a:off x="4862623" y="3902148"/>
+            <a:ext cx="414670" cy="414669"/>
+          </a:xfrm>
+          <a:prstGeom prst="ellipse">
+            <a:avLst/>
+          </a:prstGeom>
+          <a:solidFill>
+            <a:schemeClr val="accent2"/>
+          </a:solidFill>
+        </p:spPr>
+        <p:style>
+          <a:lnRef idx="2">
+            <a:schemeClr val="accent1">
+              <a:shade val="15000"/>
+            </a:schemeClr>
+          </a:lnRef>
+          <a:fillRef idx="1">
+            <a:schemeClr val="accent1"/>
+          </a:fillRef>
+          <a:effectRef idx="0">
+            <a:schemeClr val="accent1"/>
+          </a:effectRef>
+          <a:fontRef idx="minor">
+            <a:schemeClr val="lt1"/>
+          </a:fontRef>
+        </p:style>
+        <p:txBody>
+          <a:bodyPr rtlCol="0" anchor="ctr"/>
+          <a:lstStyle/>
+          <a:p>
+            <a:pPr algn="ctr"/>
+            <a:endParaRPr lang="en-IE"/>
+          </a:p>
+        </p:txBody>
+      </p:sp>
+      <p:sp>
+        <p:nvSpPr>
+          <p:cNvPr id="11" name="TextBox 10">
+            <a:extLst>
+              <a:ext uri="{FF2B5EF4-FFF2-40B4-BE49-F238E27FC236}">
+                <a16:creationId xmlns:a16="http://schemas.microsoft.com/office/drawing/2014/main" id="{8A98B95B-DACC-26E3-E842-78DDB4BEB2A9}"/>
+              </a:ext>
+            </a:extLst>
+          </p:cNvPr>
+          <p:cNvSpPr txBox="1"/>
+          <p:nvPr/>
+        </p:nvSpPr>
+        <p:spPr>
+          <a:xfrm>
+            <a:off x="4590980" y="3487479"/>
+            <a:ext cx="957955" cy="369332"/>
+          </a:xfrm>
+          <a:prstGeom prst="rect">
+            <a:avLst/>
+          </a:prstGeom>
+          <a:noFill/>
+        </p:spPr>
+        <p:txBody>
+          <a:bodyPr wrap="none" rtlCol="0">
+            <a:spAutoFit/>
+          </a:bodyPr>
+          <a:lstStyle/>
+          <a:p>
+            <a:r>
+              <a:rPr lang="en-IE" dirty="0"/>
+              <a:t>Woman</a:t>
+            </a:r>
+          </a:p>
+        </p:txBody>
+      </p:sp>
+      <p:cxnSp>
+        <p:nvCxnSpPr>
+          <p:cNvPr id="12" name="Straight Arrow Connector 11">
+            <a:extLst>
+              <a:ext uri="{FF2B5EF4-FFF2-40B4-BE49-F238E27FC236}">
+                <a16:creationId xmlns:a16="http://schemas.microsoft.com/office/drawing/2014/main" id="{ABA71193-555D-ABE1-311E-061240A17C75}"/>
+              </a:ext>
+            </a:extLst>
+          </p:cNvPr>
+          <p:cNvCxnSpPr>
+            <a:cxnSpLocks/>
+            <a:endCxn id="10" idx="3"/>
+          </p:cNvCxnSpPr>
+          <p:nvPr/>
+        </p:nvCxnSpPr>
+        <p:spPr>
+          <a:xfrm flipV="1">
+            <a:off x="2488019" y="4179175"/>
+            <a:ext cx="2386668" cy="935085"/>
+          </a:xfrm>
+          <a:prstGeom prst="straightConnector1">
+            <a:avLst/>
+          </a:prstGeom>
+          <a:ln w="38100">
+            <a:solidFill>
+              <a:schemeClr val="accent2"/>
+            </a:solidFill>
+            <a:tailEnd type="triangle"/>
+          </a:ln>
+        </p:spPr>
+        <p:style>
+          <a:lnRef idx="2">
+            <a:schemeClr val="accent1"/>
+          </a:lnRef>
+          <a:fillRef idx="0">
+            <a:schemeClr val="accent1"/>
+          </a:fillRef>
+          <a:effectRef idx="1">
+            <a:schemeClr val="accent1"/>
+          </a:effectRef>
+          <a:fontRef idx="minor">
+            <a:schemeClr val="tx1"/>
+          </a:fontRef>
+        </p:style>
+      </p:cxnSp>
+      <p:cxnSp>
+        <p:nvCxnSpPr>
+          <p:cNvPr id="3" name="Straight Arrow Connector 2">
+            <a:extLst>
+              <a:ext uri="{FF2B5EF4-FFF2-40B4-BE49-F238E27FC236}">
+                <a16:creationId xmlns:a16="http://schemas.microsoft.com/office/drawing/2014/main" id="{CCA25F85-1053-F987-B88B-A461E16C1283}"/>
+              </a:ext>
+            </a:extLst>
+          </p:cNvPr>
+          <p:cNvCxnSpPr>
+            <a:cxnSpLocks/>
+            <a:stCxn id="6" idx="5"/>
+            <a:endCxn id="10" idx="2"/>
+          </p:cNvCxnSpPr>
+          <p:nvPr/>
+        </p:nvCxnSpPr>
+        <p:spPr>
+          <a:xfrm>
+            <a:off x="3618138" y="3043979"/>
+            <a:ext cx="1264462" cy="976707"/>
+          </a:xfrm>
+          <a:prstGeom prst="straightConnector1">
+            <a:avLst/>
+          </a:prstGeom>
+          <a:ln w="38100">
+            <a:prstDash val="dashDot"/>
+            <a:tailEnd type="triangle"/>
+          </a:ln>
+        </p:spPr>
+        <p:style>
+          <a:lnRef idx="1">
+            <a:schemeClr val="dk1"/>
+          </a:lnRef>
+          <a:fillRef idx="0">
+            <a:schemeClr val="dk1"/>
+          </a:fillRef>
+          <a:effectRef idx="0">
+            <a:schemeClr val="dk1"/>
+          </a:effectRef>
+          <a:fontRef idx="minor">
+            <a:schemeClr val="tx1"/>
+          </a:fontRef>
+        </p:style>
+      </p:cxnSp>
+      <p:sp>
+        <p:nvSpPr>
+          <p:cNvPr id="8" name="TextBox 7">
+            <a:extLst>
+              <a:ext uri="{FF2B5EF4-FFF2-40B4-BE49-F238E27FC236}">
+                <a16:creationId xmlns:a16="http://schemas.microsoft.com/office/drawing/2014/main" id="{1B0C946A-0EF2-1B0E-089F-959D8DD0843F}"/>
+              </a:ext>
+            </a:extLst>
+          </p:cNvPr>
+          <p:cNvSpPr txBox="1"/>
+          <p:nvPr/>
+        </p:nvSpPr>
+        <p:spPr>
+          <a:xfrm>
+            <a:off x="4109118" y="3116028"/>
+            <a:ext cx="1106650" cy="369332"/>
+          </a:xfrm>
+          <a:prstGeom prst="rect">
+            <a:avLst/>
+          </a:prstGeom>
+          <a:noFill/>
+        </p:spPr>
+        <p:txBody>
+          <a:bodyPr wrap="none" rtlCol="0">
+            <a:spAutoFit/>
+          </a:bodyPr>
+          <a:lstStyle/>
+          <a:p>
+            <a:r>
+              <a:rPr lang="en-IE" dirty="0"/>
+              <a:t>Feminine</a:t>
+            </a:r>
+          </a:p>
+        </p:txBody>
+      </p:sp>
+    </p:spTree>
+    <p:extLst>
+      <p:ext uri="{BB962C8B-B14F-4D97-AF65-F5344CB8AC3E}">
+        <p14:creationId xmlns:p14="http://schemas.microsoft.com/office/powerpoint/2010/main" val="2344999741"/>
+      </p:ext>
+    </p:extLst>
+  </p:cSld>
+  <p:clrMapOvr>
+    <a:masterClrMapping/>
+  </p:clrMapOvr>
+</p:sld>
+</file>
+
+<file path=ppt/slides/slide14.xml><?xml version="1.0" encoding="utf-8"?>
+<p:sld xmlns:a="http://schemas.openxmlformats.org/drawingml/2006/main" xmlns:r="http://schemas.openxmlformats.org/officeDocument/2006/relationships" xmlns:p="http://schemas.openxmlformats.org/presentationml/2006/main">
+  <p:cSld>
+    <p:spTree>
+      <p:nvGrpSpPr>
+        <p:cNvPr id="1" name="">
+          <a:extLst>
+            <a:ext uri="{FF2B5EF4-FFF2-40B4-BE49-F238E27FC236}">
+              <a16:creationId xmlns:a16="http://schemas.microsoft.com/office/drawing/2014/main" id="{BC0AA898-5B3E-982F-F9FA-D26AAFA7F641}"/>
+            </a:ext>
+          </a:extLst>
+        </p:cNvPr>
+        <p:cNvGrpSpPr/>
+        <p:nvPr/>
+      </p:nvGrpSpPr>
+      <p:grpSpPr>
+        <a:xfrm>
+          <a:off x="0" y="0"/>
+          <a:ext cx="0" cy="0"/>
+          <a:chOff x="0" y="0"/>
+          <a:chExt cx="0" cy="0"/>
+        </a:xfrm>
+      </p:grpSpPr>
+      <p:sp>
+        <p:nvSpPr>
+          <p:cNvPr id="2" name="Title 1">
+            <a:extLst>
+              <a:ext uri="{FF2B5EF4-FFF2-40B4-BE49-F238E27FC236}">
+                <a16:creationId xmlns:a16="http://schemas.microsoft.com/office/drawing/2014/main" id="{11E1C38F-A066-327A-E442-2E1C40FADDB4}"/>
+              </a:ext>
+            </a:extLst>
+          </p:cNvPr>
+          <p:cNvSpPr>
+            <a:spLocks noGrp="1"/>
+          </p:cNvSpPr>
+          <p:nvPr>
+            <p:ph type="title"/>
+          </p:nvPr>
+        </p:nvSpPr>
+        <p:spPr/>
+        <p:txBody>
+          <a:bodyPr/>
+          <a:lstStyle/>
+          <a:p>
+            <a:r>
+              <a:rPr lang="en-IE" dirty="0"/>
+              <a:t>Concepts as vectors</a:t>
+            </a:r>
+          </a:p>
+        </p:txBody>
+      </p:sp>
+      <p:cxnSp>
+        <p:nvCxnSpPr>
+          <p:cNvPr id="5" name="Straight Arrow Connector 4">
+            <a:extLst>
+              <a:ext uri="{FF2B5EF4-FFF2-40B4-BE49-F238E27FC236}">
+                <a16:creationId xmlns:a16="http://schemas.microsoft.com/office/drawing/2014/main" id="{30BA41B0-0324-5CCD-F31D-2DB2FF7DA1E8}"/>
+              </a:ext>
+            </a:extLst>
+          </p:cNvPr>
+          <p:cNvCxnSpPr>
+            <a:cxnSpLocks/>
+            <a:endCxn id="6" idx="4"/>
+          </p:cNvCxnSpPr>
+          <p:nvPr/>
+        </p:nvCxnSpPr>
+        <p:spPr>
+          <a:xfrm flipV="1">
+            <a:off x="2488019" y="3104706"/>
+            <a:ext cx="983511" cy="2009554"/>
+          </a:xfrm>
+          <a:prstGeom prst="straightConnector1">
+            <a:avLst/>
+          </a:prstGeom>
+          <a:ln w="38100">
+            <a:tailEnd type="triangle"/>
+          </a:ln>
+        </p:spPr>
+        <p:style>
+          <a:lnRef idx="2">
+            <a:schemeClr val="accent1"/>
+          </a:lnRef>
+          <a:fillRef idx="0">
+            <a:schemeClr val="accent1"/>
+          </a:fillRef>
+          <a:effectRef idx="1">
+            <a:schemeClr val="accent1"/>
+          </a:effectRef>
+          <a:fontRef idx="minor">
+            <a:schemeClr val="tx1"/>
+          </a:fontRef>
+        </p:style>
+      </p:cxnSp>
+      <p:sp>
+        <p:nvSpPr>
+          <p:cNvPr id="6" name="Oval 5">
+            <a:extLst>
+              <a:ext uri="{FF2B5EF4-FFF2-40B4-BE49-F238E27FC236}">
+                <a16:creationId xmlns:a16="http://schemas.microsoft.com/office/drawing/2014/main" id="{78FDCCF7-CB92-C20B-C15C-E5D688D98C2D}"/>
+              </a:ext>
+            </a:extLst>
+          </p:cNvPr>
+          <p:cNvSpPr/>
+          <p:nvPr/>
+        </p:nvSpPr>
+        <p:spPr>
+          <a:xfrm>
+            <a:off x="3264195" y="2690037"/>
+            <a:ext cx="414670" cy="414669"/>
+          </a:xfrm>
+          <a:prstGeom prst="ellipse">
+            <a:avLst/>
+          </a:prstGeom>
+        </p:spPr>
+        <p:style>
+          <a:lnRef idx="2">
+            <a:schemeClr val="accent1">
+              <a:shade val="15000"/>
+            </a:schemeClr>
+          </a:lnRef>
+          <a:fillRef idx="1">
+            <a:schemeClr val="accent1"/>
+          </a:fillRef>
+          <a:effectRef idx="0">
+            <a:schemeClr val="accent1"/>
+          </a:effectRef>
+          <a:fontRef idx="minor">
+            <a:schemeClr val="lt1"/>
+          </a:fontRef>
+        </p:style>
+        <p:txBody>
+          <a:bodyPr rtlCol="0" anchor="ctr"/>
+          <a:lstStyle/>
+          <a:p>
+            <a:pPr algn="ctr"/>
+            <a:endParaRPr lang="en-IE"/>
+          </a:p>
+        </p:txBody>
+      </p:sp>
+      <p:sp>
+        <p:nvSpPr>
+          <p:cNvPr id="9" name="TextBox 8">
+            <a:extLst>
+              <a:ext uri="{FF2B5EF4-FFF2-40B4-BE49-F238E27FC236}">
+                <a16:creationId xmlns:a16="http://schemas.microsoft.com/office/drawing/2014/main" id="{8D87EFD2-4EF5-AB91-7041-B64E22BA53FF}"/>
+              </a:ext>
+            </a:extLst>
+          </p:cNvPr>
+          <p:cNvSpPr txBox="1"/>
+          <p:nvPr/>
+        </p:nvSpPr>
+        <p:spPr>
+          <a:xfrm>
+            <a:off x="3111271" y="2282647"/>
+            <a:ext cx="720518" cy="369332"/>
+          </a:xfrm>
+          <a:prstGeom prst="rect">
+            <a:avLst/>
+          </a:prstGeom>
+          <a:noFill/>
+        </p:spPr>
+        <p:txBody>
+          <a:bodyPr wrap="none" rtlCol="0">
+            <a:spAutoFit/>
+          </a:bodyPr>
+          <a:lstStyle/>
+          <a:p>
+            <a:r>
+              <a:rPr lang="en-IE" dirty="0"/>
+              <a:t>Actor</a:t>
+            </a:r>
+          </a:p>
+        </p:txBody>
+      </p:sp>
+      <p:sp>
+        <p:nvSpPr>
+          <p:cNvPr id="10" name="Oval 9">
+            <a:extLst>
+              <a:ext uri="{FF2B5EF4-FFF2-40B4-BE49-F238E27FC236}">
+                <a16:creationId xmlns:a16="http://schemas.microsoft.com/office/drawing/2014/main" id="{0045BE47-F480-8021-4D07-A9537CE7D5EA}"/>
+              </a:ext>
+            </a:extLst>
+          </p:cNvPr>
+          <p:cNvSpPr/>
+          <p:nvPr/>
+        </p:nvSpPr>
+        <p:spPr>
+          <a:xfrm rot="1521496">
+            <a:off x="4862623" y="3902148"/>
+            <a:ext cx="414670" cy="414669"/>
+          </a:xfrm>
+          <a:prstGeom prst="ellipse">
+            <a:avLst/>
+          </a:prstGeom>
+          <a:solidFill>
+            <a:schemeClr val="accent2"/>
+          </a:solidFill>
+        </p:spPr>
+        <p:style>
+          <a:lnRef idx="2">
+            <a:schemeClr val="accent1">
+              <a:shade val="15000"/>
+            </a:schemeClr>
+          </a:lnRef>
+          <a:fillRef idx="1">
+            <a:schemeClr val="accent1"/>
+          </a:fillRef>
+          <a:effectRef idx="0">
+            <a:schemeClr val="accent1"/>
+          </a:effectRef>
+          <a:fontRef idx="minor">
+            <a:schemeClr val="lt1"/>
+          </a:fontRef>
+        </p:style>
+        <p:txBody>
+          <a:bodyPr rtlCol="0" anchor="ctr"/>
+          <a:lstStyle/>
+          <a:p>
+            <a:pPr algn="ctr"/>
+            <a:endParaRPr lang="en-IE"/>
+          </a:p>
+        </p:txBody>
+      </p:sp>
+      <p:sp>
+        <p:nvSpPr>
+          <p:cNvPr id="11" name="TextBox 10">
+            <a:extLst>
+              <a:ext uri="{FF2B5EF4-FFF2-40B4-BE49-F238E27FC236}">
+                <a16:creationId xmlns:a16="http://schemas.microsoft.com/office/drawing/2014/main" id="{9BC10DCD-EE09-B7D9-1A2F-4346751863E4}"/>
+              </a:ext>
+            </a:extLst>
+          </p:cNvPr>
+          <p:cNvSpPr txBox="1"/>
+          <p:nvPr/>
+        </p:nvSpPr>
+        <p:spPr>
+          <a:xfrm>
+            <a:off x="4618000" y="4296531"/>
+            <a:ext cx="938142" cy="369332"/>
+          </a:xfrm>
+          <a:prstGeom prst="rect">
+            <a:avLst/>
+          </a:prstGeom>
+          <a:noFill/>
+        </p:spPr>
+        <p:txBody>
+          <a:bodyPr wrap="none" rtlCol="0">
+            <a:spAutoFit/>
+          </a:bodyPr>
+          <a:lstStyle/>
+          <a:p>
+            <a:r>
+              <a:rPr lang="en-IE" dirty="0"/>
+              <a:t>Actress</a:t>
+            </a:r>
+          </a:p>
+        </p:txBody>
+      </p:sp>
+      <p:cxnSp>
+        <p:nvCxnSpPr>
+          <p:cNvPr id="12" name="Straight Arrow Connector 11">
+            <a:extLst>
+              <a:ext uri="{FF2B5EF4-FFF2-40B4-BE49-F238E27FC236}">
+                <a16:creationId xmlns:a16="http://schemas.microsoft.com/office/drawing/2014/main" id="{A070C3D6-6B96-3C56-73FA-A7CA7191985E}"/>
+              </a:ext>
+            </a:extLst>
+          </p:cNvPr>
+          <p:cNvCxnSpPr>
+            <a:cxnSpLocks/>
+            <a:endCxn id="10" idx="3"/>
+          </p:cNvCxnSpPr>
+          <p:nvPr/>
+        </p:nvCxnSpPr>
+        <p:spPr>
+          <a:xfrm flipV="1">
+            <a:off x="2488019" y="4179175"/>
+            <a:ext cx="2386668" cy="935085"/>
+          </a:xfrm>
+          <a:prstGeom prst="straightConnector1">
+            <a:avLst/>
+          </a:prstGeom>
+          <a:ln w="38100">
+            <a:solidFill>
+              <a:schemeClr val="accent2"/>
+            </a:solidFill>
+            <a:tailEnd type="triangle"/>
+          </a:ln>
+        </p:spPr>
+        <p:style>
+          <a:lnRef idx="2">
+            <a:schemeClr val="accent1"/>
+          </a:lnRef>
+          <a:fillRef idx="0">
+            <a:schemeClr val="accent1"/>
+          </a:fillRef>
+          <a:effectRef idx="1">
+            <a:schemeClr val="accent1"/>
+          </a:effectRef>
+          <a:fontRef idx="minor">
+            <a:schemeClr val="tx1"/>
+          </a:fontRef>
+        </p:style>
+      </p:cxnSp>
+      <p:cxnSp>
+        <p:nvCxnSpPr>
+          <p:cNvPr id="3" name="Straight Arrow Connector 2">
+            <a:extLst>
+              <a:ext uri="{FF2B5EF4-FFF2-40B4-BE49-F238E27FC236}">
+                <a16:creationId xmlns:a16="http://schemas.microsoft.com/office/drawing/2014/main" id="{268F08FD-9F63-CD94-7C6D-B2B612FA6C56}"/>
+              </a:ext>
+            </a:extLst>
+          </p:cNvPr>
+          <p:cNvCxnSpPr>
+            <a:cxnSpLocks/>
+            <a:stCxn id="6" idx="5"/>
+            <a:endCxn id="10" idx="2"/>
+          </p:cNvCxnSpPr>
+          <p:nvPr/>
+        </p:nvCxnSpPr>
+        <p:spPr>
+          <a:xfrm>
+            <a:off x="3618138" y="3043979"/>
+            <a:ext cx="1264462" cy="976707"/>
+          </a:xfrm>
+          <a:prstGeom prst="straightConnector1">
+            <a:avLst/>
+          </a:prstGeom>
+          <a:ln w="38100">
+            <a:prstDash val="dashDot"/>
+            <a:tailEnd type="triangle"/>
+          </a:ln>
+        </p:spPr>
+        <p:style>
+          <a:lnRef idx="1">
+            <a:schemeClr val="dk1"/>
+          </a:lnRef>
+          <a:fillRef idx="0">
+            <a:schemeClr val="dk1"/>
+          </a:fillRef>
+          <a:effectRef idx="0">
+            <a:schemeClr val="dk1"/>
+          </a:effectRef>
+          <a:fontRef idx="minor">
+            <a:schemeClr val="tx1"/>
+          </a:fontRef>
+        </p:style>
+      </p:cxnSp>
+      <p:sp>
+        <p:nvSpPr>
+          <p:cNvPr id="8" name="TextBox 7">
+            <a:extLst>
+              <a:ext uri="{FF2B5EF4-FFF2-40B4-BE49-F238E27FC236}">
+                <a16:creationId xmlns:a16="http://schemas.microsoft.com/office/drawing/2014/main" id="{B3875518-23CE-251F-FDCB-EB023E0F629E}"/>
+              </a:ext>
+            </a:extLst>
+          </p:cNvPr>
+          <p:cNvSpPr txBox="1"/>
+          <p:nvPr/>
+        </p:nvSpPr>
+        <p:spPr>
+          <a:xfrm>
+            <a:off x="4109118" y="3116028"/>
+            <a:ext cx="1106650" cy="369332"/>
+          </a:xfrm>
+          <a:prstGeom prst="rect">
+            <a:avLst/>
+          </a:prstGeom>
+          <a:noFill/>
+        </p:spPr>
+        <p:txBody>
+          <a:bodyPr wrap="none" rtlCol="0">
+            <a:spAutoFit/>
+          </a:bodyPr>
+          <a:lstStyle/>
+          <a:p>
+            <a:r>
+              <a:rPr lang="en-IE" dirty="0"/>
+              <a:t>Feminine</a:t>
+            </a:r>
+          </a:p>
+        </p:txBody>
+      </p:sp>
+    </p:spTree>
+    <p:extLst>
+      <p:ext uri="{BB962C8B-B14F-4D97-AF65-F5344CB8AC3E}">
+        <p14:creationId xmlns:p14="http://schemas.microsoft.com/office/powerpoint/2010/main" val="2194711204"/>
+      </p:ext>
+    </p:extLst>
+  </p:cSld>
+  <p:clrMapOvr>
+    <a:masterClrMapping/>
+  </p:clrMapOvr>
+</p:sld>
+</file>
+
+<file path=ppt/slides/slide15.xml><?xml version="1.0" encoding="utf-8"?>
+<p:sld xmlns:a="http://schemas.openxmlformats.org/drawingml/2006/main" xmlns:r="http://schemas.openxmlformats.org/officeDocument/2006/relationships" xmlns:p="http://schemas.openxmlformats.org/presentationml/2006/main">
+  <p:cSld>
+    <p:spTree>
+      <p:nvGrpSpPr>
+        <p:cNvPr id="1" name=""/>
+        <p:cNvGrpSpPr/>
+        <p:nvPr/>
+      </p:nvGrpSpPr>
+      <p:grpSpPr>
+        <a:xfrm>
+          <a:off x="0" y="0"/>
+          <a:ext cx="0" cy="0"/>
+          <a:chOff x="0" y="0"/>
+          <a:chExt cx="0" cy="0"/>
+        </a:xfrm>
+      </p:grpSpPr>
+      <p:sp>
+        <p:nvSpPr>
+          <p:cNvPr id="2" name="Title 1">
+            <a:extLst>
+              <a:ext uri="{FF2B5EF4-FFF2-40B4-BE49-F238E27FC236}">
                 <a16:creationId xmlns:a16="http://schemas.microsoft.com/office/drawing/2014/main" id="{69C60AEA-3743-AF35-5EAC-6343DD9E5338}"/>
               </a:ext>
             </a:extLst>
@@ -5182,7 +7360,7 @@
 </p:sld>
 </file>
 
-<file path=ppt/slides/slide12.xml><?xml version="1.0" encoding="utf-8"?>
+<file path=ppt/slides/slide16.xml><?xml version="1.0" encoding="utf-8"?>
 <p:sld xmlns:a="http://schemas.openxmlformats.org/drawingml/2006/main" xmlns:r="http://schemas.openxmlformats.org/officeDocument/2006/relationships" xmlns:p="http://schemas.openxmlformats.org/presentationml/2006/main">
   <p:cSld>
     <p:spTree>
@@ -5274,7 +7452,7 @@
 </p:sld>
 </file>
 
-<file path=ppt/slides/slide13.xml><?xml version="1.0" encoding="utf-8"?>
+<file path=ppt/slides/slide17.xml><?xml version="1.0" encoding="utf-8"?>
 <p:sld xmlns:a="http://schemas.openxmlformats.org/drawingml/2006/main" xmlns:r="http://schemas.openxmlformats.org/officeDocument/2006/relationships" xmlns:p="http://schemas.openxmlformats.org/presentationml/2006/main">
   <p:cSld>
     <p:spTree>
@@ -5372,7 +7550,7 @@
 </p:sld>
 </file>
 
-<file path=ppt/slides/slide14.xml><?xml version="1.0" encoding="utf-8"?>
+<file path=ppt/slides/slide18.xml><?xml version="1.0" encoding="utf-8"?>
 <p:sld xmlns:a="http://schemas.openxmlformats.org/drawingml/2006/main" xmlns:r="http://schemas.openxmlformats.org/officeDocument/2006/relationships" xmlns:p="http://schemas.openxmlformats.org/presentationml/2006/main">
   <p:cSld>
     <p:spTree>
@@ -5529,7 +7707,7 @@
 </p:sld>
 </file>
 
-<file path=ppt/slides/slide15.xml><?xml version="1.0" encoding="utf-8"?>
+<file path=ppt/slides/slide19.xml><?xml version="1.0" encoding="utf-8"?>
 <p:sld xmlns:a="http://schemas.openxmlformats.org/drawingml/2006/main" xmlns:r="http://schemas.openxmlformats.org/officeDocument/2006/relationships" xmlns:p="http://schemas.openxmlformats.org/presentationml/2006/main">
   <p:cSld>
     <p:spTree>
@@ -5662,7 +7840,105 @@
 </p:sld>
 </file>
 
-<file path=ppt/slides/slide16.xml><?xml version="1.0" encoding="utf-8"?>
+<file path=ppt/slides/slide2.xml><?xml version="1.0" encoding="utf-8"?>
+<p:sld xmlns:a="http://schemas.openxmlformats.org/drawingml/2006/main" xmlns:r="http://schemas.openxmlformats.org/officeDocument/2006/relationships" xmlns:p="http://schemas.openxmlformats.org/presentationml/2006/main">
+  <p:cSld>
+    <p:spTree>
+      <p:nvGrpSpPr>
+        <p:cNvPr id="1" name=""/>
+        <p:cNvGrpSpPr/>
+        <p:nvPr/>
+      </p:nvGrpSpPr>
+      <p:grpSpPr>
+        <a:xfrm>
+          <a:off x="0" y="0"/>
+          <a:ext cx="0" cy="0"/>
+          <a:chOff x="0" y="0"/>
+          <a:chExt cx="0" cy="0"/>
+        </a:xfrm>
+      </p:grpSpPr>
+      <p:sp>
+        <p:nvSpPr>
+          <p:cNvPr id="2" name="Title 1">
+            <a:extLst>
+              <a:ext uri="{FF2B5EF4-FFF2-40B4-BE49-F238E27FC236}">
+                <a16:creationId xmlns:a16="http://schemas.microsoft.com/office/drawing/2014/main" id="{A8CAEBF7-E570-92B6-7677-CD3F0CBB456E}"/>
+              </a:ext>
+            </a:extLst>
+          </p:cNvPr>
+          <p:cNvSpPr>
+            <a:spLocks noGrp="1"/>
+          </p:cNvSpPr>
+          <p:nvPr>
+            <p:ph type="title"/>
+          </p:nvPr>
+        </p:nvSpPr>
+        <p:spPr/>
+        <p:txBody>
+          <a:bodyPr/>
+          <a:lstStyle/>
+          <a:p>
+            <a:r>
+              <a:rPr lang="en-IE" dirty="0"/>
+              <a:t>Contents</a:t>
+            </a:r>
+          </a:p>
+        </p:txBody>
+      </p:sp>
+      <p:sp>
+        <p:nvSpPr>
+          <p:cNvPr id="3" name="Content Placeholder 2">
+            <a:extLst>
+              <a:ext uri="{FF2B5EF4-FFF2-40B4-BE49-F238E27FC236}">
+                <a16:creationId xmlns:a16="http://schemas.microsoft.com/office/drawing/2014/main" id="{C3F78488-A537-4561-F625-D28D4F6CD954}"/>
+              </a:ext>
+            </a:extLst>
+          </p:cNvPr>
+          <p:cNvSpPr>
+            <a:spLocks noGrp="1"/>
+          </p:cNvSpPr>
+          <p:nvPr>
+            <p:ph idx="1"/>
+          </p:nvPr>
+        </p:nvSpPr>
+        <p:spPr/>
+        <p:txBody>
+          <a:bodyPr/>
+          <a:lstStyle/>
+          <a:p>
+            <a:r>
+              <a:rPr lang="en-IE" dirty="0"/>
+              <a:t>Molecular Language Models</a:t>
+            </a:r>
+          </a:p>
+          <a:p>
+            <a:r>
+              <a:rPr lang="en-IE" dirty="0"/>
+              <a:t>Folding and co-folding models</a:t>
+            </a:r>
+          </a:p>
+          <a:p>
+            <a:r>
+              <a:rPr lang="en-IE" dirty="0"/>
+              <a:t>Limitations of Machine Learning for biochemistry</a:t>
+            </a:r>
+          </a:p>
+        </p:txBody>
+      </p:sp>
+    </p:spTree>
+    <p:extLst>
+      <p:ext uri="{BB962C8B-B14F-4D97-AF65-F5344CB8AC3E}">
+        <p14:creationId xmlns:p14="http://schemas.microsoft.com/office/powerpoint/2010/main" val="285654032"/>
+      </p:ext>
+    </p:extLst>
+  </p:cSld>
+  <p:clrMapOvr>
+    <a:masterClrMapping/>
+  </p:clrMapOvr>
+</p:sld>
+</file>
+
+<file path=ppt/slides/slide20.xml><?xml version="1.0" encoding="utf-8"?>
 <p:sld xmlns:a="http://schemas.openxmlformats.org/drawingml/2006/main" xmlns:r="http://schemas.openxmlformats.org/officeDocument/2006/relationships" xmlns:p="http://schemas.openxmlformats.org/presentationml/2006/main">
   <p:cSld>
     <p:spTree>
@@ -5807,7 +8083,7 @@
 </p:sld>
 </file>
 
-<file path=ppt/slides/slide17.xml><?xml version="1.0" encoding="utf-8"?>
+<file path=ppt/slides/slide21.xml><?xml version="1.0" encoding="utf-8"?>
 <p:sld xmlns:a="http://schemas.openxmlformats.org/drawingml/2006/main" xmlns:r="http://schemas.openxmlformats.org/officeDocument/2006/relationships" xmlns:p="http://schemas.openxmlformats.org/presentationml/2006/main">
   <p:cSld>
     <p:spTree>
@@ -5948,7 +8224,7 @@
 </p:sld>
 </file>
 
-<file path=ppt/slides/slide18.xml><?xml version="1.0" encoding="utf-8"?>
+<file path=ppt/slides/slide22.xml><?xml version="1.0" encoding="utf-8"?>
 <p:sld xmlns:a="http://schemas.openxmlformats.org/drawingml/2006/main" xmlns:r="http://schemas.openxmlformats.org/officeDocument/2006/relationships" xmlns:p="http://schemas.openxmlformats.org/presentationml/2006/main">
   <p:cSld>
     <p:spTree>
@@ -6906,7 +9182,7 @@
 </p:sld>
 </file>
 
-<file path=ppt/slides/slide19.xml><?xml version="1.0" encoding="utf-8"?>
+<file path=ppt/slides/slide23.xml><?xml version="1.0" encoding="utf-8"?>
 <p:sld xmlns:a="http://schemas.openxmlformats.org/drawingml/2006/main" xmlns:r="http://schemas.openxmlformats.org/officeDocument/2006/relationships" xmlns:p="http://schemas.openxmlformats.org/presentationml/2006/main">
   <p:cSld>
     <p:spTree>
@@ -7019,93 +9295,7 @@
 </p:sld>
 </file>
 
-<file path=ppt/slides/slide2.xml><?xml version="1.0" encoding="utf-8"?>
-<p:sld xmlns:a="http://schemas.openxmlformats.org/drawingml/2006/main" xmlns:r="http://schemas.openxmlformats.org/officeDocument/2006/relationships" xmlns:p="http://schemas.openxmlformats.org/presentationml/2006/main">
-  <p:cSld>
-    <p:spTree>
-      <p:nvGrpSpPr>
-        <p:cNvPr id="1" name=""/>
-        <p:cNvGrpSpPr/>
-        <p:nvPr/>
-      </p:nvGrpSpPr>
-      <p:grpSpPr>
-        <a:xfrm>
-          <a:off x="0" y="0"/>
-          <a:ext cx="0" cy="0"/>
-          <a:chOff x="0" y="0"/>
-          <a:chExt cx="0" cy="0"/>
-        </a:xfrm>
-      </p:grpSpPr>
-      <p:sp>
-        <p:nvSpPr>
-          <p:cNvPr id="2" name="Title 1">
-            <a:extLst>
-              <a:ext uri="{FF2B5EF4-FFF2-40B4-BE49-F238E27FC236}">
-                <a16:creationId xmlns:a16="http://schemas.microsoft.com/office/drawing/2014/main" id="{CDB6C8A8-9781-6636-5B15-B97463870C2B}"/>
-              </a:ext>
-            </a:extLst>
-          </p:cNvPr>
-          <p:cNvSpPr>
-            <a:spLocks noGrp="1"/>
-          </p:cNvSpPr>
-          <p:nvPr>
-            <p:ph type="title"/>
-          </p:nvPr>
-        </p:nvSpPr>
-        <p:spPr/>
-        <p:txBody>
-          <a:bodyPr/>
-          <a:lstStyle/>
-          <a:p>
-            <a:r>
-              <a:rPr lang="en-IE" dirty="0"/>
-              <a:t>What are language models?</a:t>
-            </a:r>
-          </a:p>
-        </p:txBody>
-      </p:sp>
-      <p:sp>
-        <p:nvSpPr>
-          <p:cNvPr id="3" name="Text Placeholder 2">
-            <a:extLst>
-              <a:ext uri="{FF2B5EF4-FFF2-40B4-BE49-F238E27FC236}">
-                <a16:creationId xmlns:a16="http://schemas.microsoft.com/office/drawing/2014/main" id="{5AAD7F65-D3E2-37D5-CE07-122BFBE5AEA5}"/>
-              </a:ext>
-            </a:extLst>
-          </p:cNvPr>
-          <p:cNvSpPr>
-            <a:spLocks noGrp="1"/>
-          </p:cNvSpPr>
-          <p:nvPr>
-            <p:ph type="body" idx="1"/>
-          </p:nvPr>
-        </p:nvSpPr>
-        <p:spPr/>
-        <p:txBody>
-          <a:bodyPr/>
-          <a:lstStyle/>
-          <a:p>
-            <a:r>
-              <a:rPr lang="en-IE" dirty="0"/>
-              <a:t>Natural language processing basics</a:t>
-            </a:r>
-          </a:p>
-        </p:txBody>
-      </p:sp>
-    </p:spTree>
-    <p:extLst>
-      <p:ext uri="{BB962C8B-B14F-4D97-AF65-F5344CB8AC3E}">
-        <p14:creationId xmlns:p14="http://schemas.microsoft.com/office/powerpoint/2010/main" val="2805466126"/>
-      </p:ext>
-    </p:extLst>
-  </p:cSld>
-  <p:clrMapOvr>
-    <a:masterClrMapping/>
-  </p:clrMapOvr>
-</p:sld>
-</file>
-
-<file path=ppt/slides/slide20.xml><?xml version="1.0" encoding="utf-8"?>
+<file path=ppt/slides/slide24.xml><?xml version="1.0" encoding="utf-8"?>
 <p:sld xmlns:a="http://schemas.openxmlformats.org/drawingml/2006/main" xmlns:r="http://schemas.openxmlformats.org/officeDocument/2006/relationships" xmlns:p="http://schemas.openxmlformats.org/presentationml/2006/main">
   <p:cSld>
     <p:spTree>
@@ -7397,7 +9587,7 @@
 </p:sld>
 </file>
 
-<file path=ppt/slides/slide21.xml><?xml version="1.0" encoding="utf-8"?>
+<file path=ppt/slides/slide25.xml><?xml version="1.0" encoding="utf-8"?>
 <p:sld xmlns:a="http://schemas.openxmlformats.org/drawingml/2006/main" xmlns:r="http://schemas.openxmlformats.org/officeDocument/2006/relationships" xmlns:p="http://schemas.openxmlformats.org/presentationml/2006/main">
   <p:cSld>
     <p:spTree>
@@ -7504,7 +9694,7 @@
 </p:sld>
 </file>
 
-<file path=ppt/slides/slide22.xml><?xml version="1.0" encoding="utf-8"?>
+<file path=ppt/slides/slide26.xml><?xml version="1.0" encoding="utf-8"?>
 <p:sld xmlns:a="http://schemas.openxmlformats.org/drawingml/2006/main" xmlns:r="http://schemas.openxmlformats.org/officeDocument/2006/relationships" xmlns:p="http://schemas.openxmlformats.org/presentationml/2006/main">
   <p:cSld>
     <p:spTree>
@@ -7596,7 +9786,7 @@
 </p:sld>
 </file>
 
-<file path=ppt/slides/slide23.xml><?xml version="1.0" encoding="utf-8"?>
+<file path=ppt/slides/slide27.xml><?xml version="1.0" encoding="utf-8"?>
 <p:sld xmlns:a="http://schemas.openxmlformats.org/drawingml/2006/main" xmlns:r="http://schemas.openxmlformats.org/officeDocument/2006/relationships" xmlns:p="http://schemas.openxmlformats.org/presentationml/2006/main">
   <p:cSld>
     <p:spTree>
@@ -7789,7 +9979,7 @@
 </p:sld>
 </file>
 
-<file path=ppt/slides/slide24.xml><?xml version="1.0" encoding="utf-8"?>
+<file path=ppt/slides/slide28.xml><?xml version="1.0" encoding="utf-8"?>
 <p:sld xmlns:a="http://schemas.openxmlformats.org/drawingml/2006/main" xmlns:r="http://schemas.openxmlformats.org/officeDocument/2006/relationships" xmlns:p="http://schemas.openxmlformats.org/presentationml/2006/main">
   <p:cSld>
     <p:spTree>
@@ -7947,7 +10137,7 @@
 </p:sld>
 </file>
 
-<file path=ppt/slides/slide25.xml><?xml version="1.0" encoding="utf-8"?>
+<file path=ppt/slides/slide29.xml><?xml version="1.0" encoding="utf-8"?>
 <p:sld xmlns:a="http://schemas.openxmlformats.org/drawingml/2006/main" xmlns:r="http://schemas.openxmlformats.org/officeDocument/2006/relationships" xmlns:p="http://schemas.openxmlformats.org/presentationml/2006/main">
   <p:cSld>
     <p:spTree>
@@ -8128,7 +10318,93 @@
 </p:sld>
 </file>
 
-<file path=ppt/slides/slide26.xml><?xml version="1.0" encoding="utf-8"?>
+<file path=ppt/slides/slide3.xml><?xml version="1.0" encoding="utf-8"?>
+<p:sld xmlns:a="http://schemas.openxmlformats.org/drawingml/2006/main" xmlns:r="http://schemas.openxmlformats.org/officeDocument/2006/relationships" xmlns:p="http://schemas.openxmlformats.org/presentationml/2006/main">
+  <p:cSld>
+    <p:spTree>
+      <p:nvGrpSpPr>
+        <p:cNvPr id="1" name=""/>
+        <p:cNvGrpSpPr/>
+        <p:nvPr/>
+      </p:nvGrpSpPr>
+      <p:grpSpPr>
+        <a:xfrm>
+          <a:off x="0" y="0"/>
+          <a:ext cx="0" cy="0"/>
+          <a:chOff x="0" y="0"/>
+          <a:chExt cx="0" cy="0"/>
+        </a:xfrm>
+      </p:grpSpPr>
+      <p:sp>
+        <p:nvSpPr>
+          <p:cNvPr id="2" name="Title 1">
+            <a:extLst>
+              <a:ext uri="{FF2B5EF4-FFF2-40B4-BE49-F238E27FC236}">
+                <a16:creationId xmlns:a16="http://schemas.microsoft.com/office/drawing/2014/main" id="{CDB6C8A8-9781-6636-5B15-B97463870C2B}"/>
+              </a:ext>
+            </a:extLst>
+          </p:cNvPr>
+          <p:cNvSpPr>
+            <a:spLocks noGrp="1"/>
+          </p:cNvSpPr>
+          <p:nvPr>
+            <p:ph type="title"/>
+          </p:nvPr>
+        </p:nvSpPr>
+        <p:spPr/>
+        <p:txBody>
+          <a:bodyPr/>
+          <a:lstStyle/>
+          <a:p>
+            <a:r>
+              <a:rPr lang="en-IE" dirty="0"/>
+              <a:t>What are language models?</a:t>
+            </a:r>
+          </a:p>
+        </p:txBody>
+      </p:sp>
+      <p:sp>
+        <p:nvSpPr>
+          <p:cNvPr id="3" name="Text Placeholder 2">
+            <a:extLst>
+              <a:ext uri="{FF2B5EF4-FFF2-40B4-BE49-F238E27FC236}">
+                <a16:creationId xmlns:a16="http://schemas.microsoft.com/office/drawing/2014/main" id="{5AAD7F65-D3E2-37D5-CE07-122BFBE5AEA5}"/>
+              </a:ext>
+            </a:extLst>
+          </p:cNvPr>
+          <p:cNvSpPr>
+            <a:spLocks noGrp="1"/>
+          </p:cNvSpPr>
+          <p:nvPr>
+            <p:ph type="body" idx="1"/>
+          </p:nvPr>
+        </p:nvSpPr>
+        <p:spPr/>
+        <p:txBody>
+          <a:bodyPr/>
+          <a:lstStyle/>
+          <a:p>
+            <a:r>
+              <a:rPr lang="en-IE" dirty="0"/>
+              <a:t>Natural language processing basics</a:t>
+            </a:r>
+          </a:p>
+        </p:txBody>
+      </p:sp>
+    </p:spTree>
+    <p:extLst>
+      <p:ext uri="{BB962C8B-B14F-4D97-AF65-F5344CB8AC3E}">
+        <p14:creationId xmlns:p14="http://schemas.microsoft.com/office/powerpoint/2010/main" val="2805466126"/>
+      </p:ext>
+    </p:extLst>
+  </p:cSld>
+  <p:clrMapOvr>
+    <a:masterClrMapping/>
+  </p:clrMapOvr>
+</p:sld>
+</file>
+
+<file path=ppt/slides/slide30.xml><?xml version="1.0" encoding="utf-8"?>
 <p:sld xmlns:a="http://schemas.openxmlformats.org/drawingml/2006/main" xmlns:r="http://schemas.openxmlformats.org/officeDocument/2006/relationships" xmlns:p="http://schemas.openxmlformats.org/presentationml/2006/main">
   <p:cSld>
     <p:spTree>
@@ -8747,7 +11023,7 @@
 </p:sld>
 </file>
 
-<file path=ppt/slides/slide27.xml><?xml version="1.0" encoding="utf-8"?>
+<file path=ppt/slides/slide31.xml><?xml version="1.0" encoding="utf-8"?>
 <p:sld xmlns:a="http://schemas.openxmlformats.org/drawingml/2006/main" xmlns:r="http://schemas.openxmlformats.org/officeDocument/2006/relationships" xmlns:p="http://schemas.openxmlformats.org/presentationml/2006/main">
   <p:cSld>
     <p:spTree>
@@ -8931,7 +11207,7 @@
 </p:sld>
 </file>
 
-<file path=ppt/slides/slide28.xml><?xml version="1.0" encoding="utf-8"?>
+<file path=ppt/slides/slide32.xml><?xml version="1.0" encoding="utf-8"?>
 <p:sld xmlns:a="http://schemas.openxmlformats.org/drawingml/2006/main" xmlns:r="http://schemas.openxmlformats.org/officeDocument/2006/relationships" xmlns:p="http://schemas.openxmlformats.org/presentationml/2006/main">
   <p:cSld>
     <p:spTree>
@@ -9104,7 +11380,7 @@
 </p:sld>
 </file>
 
-<file path=ppt/slides/slide29.xml><?xml version="1.0" encoding="utf-8"?>
+<file path=ppt/slides/slide33.xml><?xml version="1.0" encoding="utf-8"?>
 <p:sld xmlns:a="http://schemas.openxmlformats.org/drawingml/2006/main" xmlns:r="http://schemas.openxmlformats.org/officeDocument/2006/relationships" xmlns:p="http://schemas.openxmlformats.org/presentationml/2006/main">
   <p:cSld>
     <p:spTree>
@@ -9270,97 +11546,7 @@
 </p:sld>
 </file>
 
-<file path=ppt/slides/slide3.xml><?xml version="1.0" encoding="utf-8"?>
-<p:sld xmlns:a="http://schemas.openxmlformats.org/drawingml/2006/main" xmlns:r="http://schemas.openxmlformats.org/officeDocument/2006/relationships" xmlns:p="http://schemas.openxmlformats.org/presentationml/2006/main">
-  <p:cSld>
-    <p:spTree>
-      <p:nvGrpSpPr>
-        <p:cNvPr id="1" name=""/>
-        <p:cNvGrpSpPr/>
-        <p:nvPr/>
-      </p:nvGrpSpPr>
-      <p:grpSpPr>
-        <a:xfrm>
-          <a:off x="0" y="0"/>
-          <a:ext cx="0" cy="0"/>
-          <a:chOff x="0" y="0"/>
-          <a:chExt cx="0" cy="0"/>
-        </a:xfrm>
-      </p:grpSpPr>
-      <p:sp>
-        <p:nvSpPr>
-          <p:cNvPr id="2" name="Title 1">
-            <a:extLst>
-              <a:ext uri="{FF2B5EF4-FFF2-40B4-BE49-F238E27FC236}">
-                <a16:creationId xmlns:a16="http://schemas.microsoft.com/office/drawing/2014/main" id="{85D4509B-E235-AD00-759E-77C96DA42329}"/>
-              </a:ext>
-            </a:extLst>
-          </p:cNvPr>
-          <p:cNvSpPr>
-            <a:spLocks noGrp="1"/>
-          </p:cNvSpPr>
-          <p:nvPr>
-            <p:ph type="title"/>
-          </p:nvPr>
-        </p:nvSpPr>
-        <p:spPr/>
-        <p:txBody>
-          <a:bodyPr/>
-          <a:lstStyle/>
-          <a:p>
-            <a:r>
-              <a:rPr lang="en-IE" dirty="0"/>
-              <a:t>Natural language</a:t>
-            </a:r>
-          </a:p>
-        </p:txBody>
-      </p:sp>
-      <p:pic>
-        <p:nvPicPr>
-          <p:cNvPr id="4" name="Content Placeholder 3" descr="A screenshot of a computer&#10;&#10;Description automatically generated">
-            <a:extLst>
-              <a:ext uri="{FF2B5EF4-FFF2-40B4-BE49-F238E27FC236}">
-                <a16:creationId xmlns:a16="http://schemas.microsoft.com/office/drawing/2014/main" id="{BF8156BB-5F25-8CD0-5539-341D79926C7E}"/>
-              </a:ext>
-            </a:extLst>
-          </p:cNvPr>
-          <p:cNvPicPr>
-            <a:picLocks noGrp="1" noChangeAspect="1"/>
-          </p:cNvPicPr>
-          <p:nvPr>
-            <p:ph idx="1"/>
-          </p:nvPr>
-        </p:nvPicPr>
-        <p:blipFill>
-          <a:blip r:embed="rId2"/>
-          <a:stretch>
-            <a:fillRect/>
-          </a:stretch>
-        </p:blipFill>
-        <p:spPr>
-          <a:xfrm>
-            <a:off x="1655251" y="1825625"/>
-            <a:ext cx="8881498" cy="4351338"/>
-          </a:xfrm>
-          <a:prstGeom prst="rect">
-            <a:avLst/>
-          </a:prstGeom>
-        </p:spPr>
-      </p:pic>
-    </p:spTree>
-    <p:extLst>
-      <p:ext uri="{BB962C8B-B14F-4D97-AF65-F5344CB8AC3E}">
-        <p14:creationId xmlns:p14="http://schemas.microsoft.com/office/powerpoint/2010/main" val="298487341"/>
-      </p:ext>
-    </p:extLst>
-  </p:cSld>
-  <p:clrMapOvr>
-    <a:masterClrMapping/>
-  </p:clrMapOvr>
-</p:sld>
-</file>
-
-<file path=ppt/slides/slide30.xml><?xml version="1.0" encoding="utf-8"?>
+<file path=ppt/slides/slide34.xml><?xml version="1.0" encoding="utf-8"?>
 <p:sld xmlns:a="http://schemas.openxmlformats.org/drawingml/2006/main" xmlns:r="http://schemas.openxmlformats.org/officeDocument/2006/relationships" xmlns:p="http://schemas.openxmlformats.org/presentationml/2006/main">
   <p:cSld>
     <p:spTree>
@@ -9795,7 +11981,7 @@
 </p:sld>
 </file>
 
-<file path=ppt/slides/slide31.xml><?xml version="1.0" encoding="utf-8"?>
+<file path=ppt/slides/slide35.xml><?xml version="1.0" encoding="utf-8"?>
 <p:sld xmlns:a="http://schemas.openxmlformats.org/drawingml/2006/main" xmlns:r="http://schemas.openxmlformats.org/officeDocument/2006/relationships" xmlns:p="http://schemas.openxmlformats.org/presentationml/2006/main">
   <p:cSld>
     <p:spTree>
@@ -9894,7 +12080,7 @@
 </p:sld>
 </file>
 
-<file path=ppt/slides/slide32.xml><?xml version="1.0" encoding="utf-8"?>
+<file path=ppt/slides/slide36.xml><?xml version="1.0" encoding="utf-8"?>
 <p:sld xmlns:a="http://schemas.openxmlformats.org/drawingml/2006/main" xmlns:r="http://schemas.openxmlformats.org/officeDocument/2006/relationships" xmlns:p="http://schemas.openxmlformats.org/presentationml/2006/main">
   <p:cSld>
     <p:spTree>
@@ -10049,7 +12235,7 @@
 </p:sld>
 </file>
 
-<file path=ppt/slides/slide33.xml><?xml version="1.0" encoding="utf-8"?>
+<file path=ppt/slides/slide37.xml><?xml version="1.0" encoding="utf-8"?>
 <p:sld xmlns:a="http://schemas.openxmlformats.org/drawingml/2006/main" xmlns:r="http://schemas.openxmlformats.org/officeDocument/2006/relationships" xmlns:p="http://schemas.openxmlformats.org/presentationml/2006/main">
   <p:cSld>
     <p:spTree>
@@ -10154,6 +12340,96 @@
 </file>
 
 <file path=ppt/slides/slide4.xml><?xml version="1.0" encoding="utf-8"?>
+<p:sld xmlns:a="http://schemas.openxmlformats.org/drawingml/2006/main" xmlns:r="http://schemas.openxmlformats.org/officeDocument/2006/relationships" xmlns:p="http://schemas.openxmlformats.org/presentationml/2006/main">
+  <p:cSld>
+    <p:spTree>
+      <p:nvGrpSpPr>
+        <p:cNvPr id="1" name=""/>
+        <p:cNvGrpSpPr/>
+        <p:nvPr/>
+      </p:nvGrpSpPr>
+      <p:grpSpPr>
+        <a:xfrm>
+          <a:off x="0" y="0"/>
+          <a:ext cx="0" cy="0"/>
+          <a:chOff x="0" y="0"/>
+          <a:chExt cx="0" cy="0"/>
+        </a:xfrm>
+      </p:grpSpPr>
+      <p:sp>
+        <p:nvSpPr>
+          <p:cNvPr id="2" name="Title 1">
+            <a:extLst>
+              <a:ext uri="{FF2B5EF4-FFF2-40B4-BE49-F238E27FC236}">
+                <a16:creationId xmlns:a16="http://schemas.microsoft.com/office/drawing/2014/main" id="{85D4509B-E235-AD00-759E-77C96DA42329}"/>
+              </a:ext>
+            </a:extLst>
+          </p:cNvPr>
+          <p:cNvSpPr>
+            <a:spLocks noGrp="1"/>
+          </p:cNvSpPr>
+          <p:nvPr>
+            <p:ph type="title"/>
+          </p:nvPr>
+        </p:nvSpPr>
+        <p:spPr/>
+        <p:txBody>
+          <a:bodyPr/>
+          <a:lstStyle/>
+          <a:p>
+            <a:r>
+              <a:rPr lang="en-IE" dirty="0"/>
+              <a:t>Natural language</a:t>
+            </a:r>
+          </a:p>
+        </p:txBody>
+      </p:sp>
+      <p:pic>
+        <p:nvPicPr>
+          <p:cNvPr id="4" name="Content Placeholder 3" descr="A screenshot of a computer&#10;&#10;Description automatically generated">
+            <a:extLst>
+              <a:ext uri="{FF2B5EF4-FFF2-40B4-BE49-F238E27FC236}">
+                <a16:creationId xmlns:a16="http://schemas.microsoft.com/office/drawing/2014/main" id="{BF8156BB-5F25-8CD0-5539-341D79926C7E}"/>
+              </a:ext>
+            </a:extLst>
+          </p:cNvPr>
+          <p:cNvPicPr>
+            <a:picLocks noGrp="1" noChangeAspect="1"/>
+          </p:cNvPicPr>
+          <p:nvPr>
+            <p:ph idx="1"/>
+          </p:nvPr>
+        </p:nvPicPr>
+        <p:blipFill>
+          <a:blip r:embed="rId2"/>
+          <a:stretch>
+            <a:fillRect/>
+          </a:stretch>
+        </p:blipFill>
+        <p:spPr>
+          <a:xfrm>
+            <a:off x="1655251" y="1825625"/>
+            <a:ext cx="8881498" cy="4351338"/>
+          </a:xfrm>
+          <a:prstGeom prst="rect">
+            <a:avLst/>
+          </a:prstGeom>
+        </p:spPr>
+      </p:pic>
+    </p:spTree>
+    <p:extLst>
+      <p:ext uri="{BB962C8B-B14F-4D97-AF65-F5344CB8AC3E}">
+        <p14:creationId xmlns:p14="http://schemas.microsoft.com/office/powerpoint/2010/main" val="298487341"/>
+      </p:ext>
+    </p:extLst>
+  </p:cSld>
+  <p:clrMapOvr>
+    <a:masterClrMapping/>
+  </p:clrMapOvr>
+</p:sld>
+</file>
+
+<file path=ppt/slides/slide5.xml><?xml version="1.0" encoding="utf-8"?>
 <p:sld xmlns:a="http://schemas.openxmlformats.org/drawingml/2006/main" xmlns:r="http://schemas.openxmlformats.org/officeDocument/2006/relationships" xmlns:p="http://schemas.openxmlformats.org/presentationml/2006/main">
   <p:cSld>
     <p:spTree>
@@ -10266,7 +12542,7 @@
 </p:sld>
 </file>
 
-<file path=ppt/slides/slide5.xml><?xml version="1.0" encoding="utf-8"?>
+<file path=ppt/slides/slide6.xml><?xml version="1.0" encoding="utf-8"?>
 <p:sld xmlns:a="http://schemas.openxmlformats.org/drawingml/2006/main" xmlns:r="http://schemas.openxmlformats.org/officeDocument/2006/relationships" xmlns:p="http://schemas.openxmlformats.org/presentationml/2006/main">
   <p:cSld>
     <p:spTree>
@@ -10579,7 +12855,7 @@
 </p:sld>
 </file>
 
-<file path=ppt/slides/slide6.xml><?xml version="1.0" encoding="utf-8"?>
+<file path=ppt/slides/slide7.xml><?xml version="1.0" encoding="utf-8"?>
 <p:sld xmlns:a="http://schemas.openxmlformats.org/drawingml/2006/main" xmlns:r="http://schemas.openxmlformats.org/officeDocument/2006/relationships" xmlns:p="http://schemas.openxmlformats.org/presentationml/2006/main">
   <p:cSld>
     <p:spTree>
@@ -11103,7 +13379,7 @@
 </p:sld>
 </file>
 
-<file path=ppt/slides/slide7.xml><?xml version="1.0" encoding="utf-8"?>
+<file path=ppt/slides/slide8.xml><?xml version="1.0" encoding="utf-8"?>
 <p:sld xmlns:a="http://schemas.openxmlformats.org/drawingml/2006/main" xmlns:r="http://schemas.openxmlformats.org/officeDocument/2006/relationships" xmlns:p="http://schemas.openxmlformats.org/presentationml/2006/main">
   <p:cSld>
     <p:spTree>
@@ -11749,7 +14025,7 @@
 </p:sld>
 </file>
 
-<file path=ppt/slides/slide8.xml><?xml version="1.0" encoding="utf-8"?>
+<file path=ppt/slides/slide9.xml><?xml version="1.0" encoding="utf-8"?>
 <p:sld xmlns:a="http://schemas.openxmlformats.org/drawingml/2006/main" xmlns:r="http://schemas.openxmlformats.org/officeDocument/2006/relationships" xmlns:p="http://schemas.openxmlformats.org/presentationml/2006/main">
   <p:cSld>
     <p:spTree>
@@ -12661,1080 +14937,6 @@
     <p:extLst>
       <p:ext uri="{BB962C8B-B14F-4D97-AF65-F5344CB8AC3E}">
         <p14:creationId xmlns:p14="http://schemas.microsoft.com/office/powerpoint/2010/main" val="1478873277"/>
-      </p:ext>
-    </p:extLst>
-  </p:cSld>
-  <p:clrMapOvr>
-    <a:masterClrMapping/>
-  </p:clrMapOvr>
-</p:sld>
-</file>
-
-<file path=ppt/slides/slide9.xml><?xml version="1.0" encoding="utf-8"?>
-<p:sld xmlns:a="http://schemas.openxmlformats.org/drawingml/2006/main" xmlns:r="http://schemas.openxmlformats.org/officeDocument/2006/relationships" xmlns:p="http://schemas.openxmlformats.org/presentationml/2006/main">
-  <p:cSld>
-    <p:spTree>
-      <p:nvGrpSpPr>
-        <p:cNvPr id="1" name="">
-          <a:extLst>
-            <a:ext uri="{FF2B5EF4-FFF2-40B4-BE49-F238E27FC236}">
-              <a16:creationId xmlns:a16="http://schemas.microsoft.com/office/drawing/2014/main" id="{EDA5DAA9-7B74-3EFA-BDCF-73D3FF0C483D}"/>
-            </a:ext>
-          </a:extLst>
-        </p:cNvPr>
-        <p:cNvGrpSpPr/>
-        <p:nvPr/>
-      </p:nvGrpSpPr>
-      <p:grpSpPr>
-        <a:xfrm>
-          <a:off x="0" y="0"/>
-          <a:ext cx="0" cy="0"/>
-          <a:chOff x="0" y="0"/>
-          <a:chExt cx="0" cy="0"/>
-        </a:xfrm>
-      </p:grpSpPr>
-      <p:sp>
-        <p:nvSpPr>
-          <p:cNvPr id="2" name="Title 1">
-            <a:extLst>
-              <a:ext uri="{FF2B5EF4-FFF2-40B4-BE49-F238E27FC236}">
-                <a16:creationId xmlns:a16="http://schemas.microsoft.com/office/drawing/2014/main" id="{1CB3D3DC-3622-5F68-89B0-71F71F8EC397}"/>
-              </a:ext>
-            </a:extLst>
-          </p:cNvPr>
-          <p:cNvSpPr>
-            <a:spLocks noGrp="1"/>
-          </p:cNvSpPr>
-          <p:nvPr>
-            <p:ph type="title"/>
-          </p:nvPr>
-        </p:nvSpPr>
-        <p:spPr/>
-        <p:txBody>
-          <a:bodyPr/>
-          <a:lstStyle/>
-          <a:p>
-            <a:r>
-              <a:rPr lang="en-IE" dirty="0"/>
-              <a:t>How can we teach a model languages?</a:t>
-            </a:r>
-          </a:p>
-        </p:txBody>
-      </p:sp>
-      <p:pic>
-        <p:nvPicPr>
-          <p:cNvPr id="4" name="Picture 2" descr="Baby - Free people icons">
-            <a:extLst>
-              <a:ext uri="{FF2B5EF4-FFF2-40B4-BE49-F238E27FC236}">
-                <a16:creationId xmlns:a16="http://schemas.microsoft.com/office/drawing/2014/main" id="{C0393CB9-50F8-59AE-5DB3-6339D65041D8}"/>
-              </a:ext>
-            </a:extLst>
-          </p:cNvPr>
-          <p:cNvPicPr>
-            <a:picLocks noGrp="1" noChangeAspect="1" noChangeArrowheads="1"/>
-          </p:cNvPicPr>
-          <p:nvPr>
-            <p:ph idx="1"/>
-          </p:nvPr>
-        </p:nvPicPr>
-        <p:blipFill>
-          <a:blip r:embed="rId3">
-            <a:extLst>
-              <a:ext uri="{28A0092B-C50C-407E-A947-70E740481C1C}">
-                <a14:useLocalDpi xmlns:a14="http://schemas.microsoft.com/office/drawing/2010/main" val="0"/>
-              </a:ext>
-            </a:extLst>
-          </a:blip>
-          <a:srcRect/>
-          <a:stretch>
-            <a:fillRect/>
-          </a:stretch>
-        </p:blipFill>
-        <p:spPr bwMode="auto">
-          <a:xfrm>
-            <a:off x="8778028" y="4728575"/>
-            <a:ext cx="1764300" cy="1764300"/>
-          </a:xfrm>
-          <a:prstGeom prst="rect">
-            <a:avLst/>
-          </a:prstGeom>
-          <a:noFill/>
-          <a:extLst>
-            <a:ext uri="{909E8E84-426E-40DD-AFC4-6F175D3DCCD1}">
-              <a14:hiddenFill xmlns:a14="http://schemas.microsoft.com/office/drawing/2010/main">
-                <a:solidFill>
-                  <a:srgbClr val="FFFFFF"/>
-                </a:solidFill>
-              </a14:hiddenFill>
-            </a:ext>
-          </a:extLst>
-        </p:spPr>
-      </p:pic>
-      <p:pic>
-        <p:nvPicPr>
-          <p:cNvPr id="6" name="Graphic 5" descr="Robot outline">
-            <a:extLst>
-              <a:ext uri="{FF2B5EF4-FFF2-40B4-BE49-F238E27FC236}">
-                <a16:creationId xmlns:a16="http://schemas.microsoft.com/office/drawing/2014/main" id="{668BF5C5-CE54-B4B6-9508-ADB73327CACB}"/>
-              </a:ext>
-            </a:extLst>
-          </p:cNvPr>
-          <p:cNvPicPr>
-            <a:picLocks noChangeAspect="1"/>
-          </p:cNvPicPr>
-          <p:nvPr/>
-        </p:nvPicPr>
-        <p:blipFill>
-          <a:blip r:embed="rId4">
-            <a:extLst>
-              <a:ext uri="{96DAC541-7B7A-43D3-8B79-37D633B846F1}">
-                <asvg:svgBlip xmlns:asvg="http://schemas.microsoft.com/office/drawing/2016/SVG/main" r:embed="rId5"/>
-              </a:ext>
-            </a:extLst>
-          </a:blip>
-          <a:stretch>
-            <a:fillRect/>
-          </a:stretch>
-        </p:blipFill>
-        <p:spPr>
-          <a:xfrm>
-            <a:off x="10204124" y="4787138"/>
-            <a:ext cx="1647173" cy="1647173"/>
-          </a:xfrm>
-          <a:prstGeom prst="rect">
-            <a:avLst/>
-          </a:prstGeom>
-        </p:spPr>
-      </p:pic>
-      <p:grpSp>
-        <p:nvGrpSpPr>
-          <p:cNvPr id="48" name="Group 47">
-            <a:extLst>
-              <a:ext uri="{FF2B5EF4-FFF2-40B4-BE49-F238E27FC236}">
-                <a16:creationId xmlns:a16="http://schemas.microsoft.com/office/drawing/2014/main" id="{8D7D42D4-C747-D5EF-3B2E-EE221313C146}"/>
-              </a:ext>
-            </a:extLst>
-          </p:cNvPr>
-          <p:cNvGrpSpPr/>
-          <p:nvPr/>
-        </p:nvGrpSpPr>
-        <p:grpSpPr>
-          <a:xfrm>
-            <a:off x="8442404" y="2474475"/>
-            <a:ext cx="3553605" cy="1713447"/>
-            <a:chOff x="8442404" y="2474475"/>
-            <a:chExt cx="3553605" cy="1713447"/>
-          </a:xfrm>
-        </p:grpSpPr>
-        <p:sp>
-          <p:nvSpPr>
-            <p:cNvPr id="9" name="Rounded Rectangle 8">
-              <a:extLst>
-                <a:ext uri="{FF2B5EF4-FFF2-40B4-BE49-F238E27FC236}">
-                  <a16:creationId xmlns:a16="http://schemas.microsoft.com/office/drawing/2014/main" id="{C1478DEB-FF0F-FA3D-4600-CB5F4819FA37}"/>
-                </a:ext>
-              </a:extLst>
-            </p:cNvPr>
-            <p:cNvSpPr/>
-            <p:nvPr/>
-          </p:nvSpPr>
-          <p:spPr>
-            <a:xfrm>
-              <a:off x="8586631" y="3619256"/>
-              <a:ext cx="1478522" cy="563753"/>
-            </a:xfrm>
-            <a:prstGeom prst="roundRect">
-              <a:avLst/>
-            </a:prstGeom>
-            <a:solidFill>
-              <a:schemeClr val="accent2">
-                <a:lumMod val="20000"/>
-                <a:lumOff val="80000"/>
-              </a:schemeClr>
-            </a:solidFill>
-          </p:spPr>
-          <p:style>
-            <a:lnRef idx="2">
-              <a:schemeClr val="accent1">
-                <a:shade val="15000"/>
-              </a:schemeClr>
-            </a:lnRef>
-            <a:fillRef idx="1">
-              <a:schemeClr val="accent1"/>
-            </a:fillRef>
-            <a:effectRef idx="0">
-              <a:schemeClr val="accent1"/>
-            </a:effectRef>
-            <a:fontRef idx="minor">
-              <a:schemeClr val="lt1"/>
-            </a:fontRef>
-          </p:style>
-          <p:txBody>
-            <a:bodyPr rtlCol="0" anchor="ctr"/>
-            <a:lstStyle/>
-            <a:p>
-              <a:pPr algn="ctr"/>
-              <a:r>
-                <a:rPr lang="en-IE" dirty="0">
-                  <a:solidFill>
-                    <a:schemeClr val="tx1"/>
-                  </a:solidFill>
-                </a:rPr>
-                <a:t>Observation</a:t>
-              </a:r>
-            </a:p>
-          </p:txBody>
-        </p:sp>
-        <p:sp>
-          <p:nvSpPr>
-            <p:cNvPr id="11" name="Rounded Rectangle 10">
-              <a:extLst>
-                <a:ext uri="{FF2B5EF4-FFF2-40B4-BE49-F238E27FC236}">
-                  <a16:creationId xmlns:a16="http://schemas.microsoft.com/office/drawing/2014/main" id="{D4693CA2-CB77-F71D-F131-6833D127F314}"/>
-                </a:ext>
-              </a:extLst>
-            </p:cNvPr>
-            <p:cNvSpPr/>
-            <p:nvPr/>
-          </p:nvSpPr>
-          <p:spPr>
-            <a:xfrm>
-              <a:off x="9331889" y="2474475"/>
-              <a:ext cx="1605133" cy="568666"/>
-            </a:xfrm>
-            <a:prstGeom prst="roundRect">
-              <a:avLst/>
-            </a:prstGeom>
-            <a:solidFill>
-              <a:schemeClr val="accent6">
-                <a:lumMod val="40000"/>
-                <a:lumOff val="60000"/>
-              </a:schemeClr>
-            </a:solidFill>
-          </p:spPr>
-          <p:style>
-            <a:lnRef idx="2">
-              <a:schemeClr val="accent1">
-                <a:shade val="15000"/>
-              </a:schemeClr>
-            </a:lnRef>
-            <a:fillRef idx="1">
-              <a:schemeClr val="accent1"/>
-            </a:fillRef>
-            <a:effectRef idx="0">
-              <a:schemeClr val="accent1"/>
-            </a:effectRef>
-            <a:fontRef idx="minor">
-              <a:schemeClr val="lt1"/>
-            </a:fontRef>
-          </p:style>
-          <p:txBody>
-            <a:bodyPr rtlCol="0" anchor="ctr"/>
-            <a:lstStyle/>
-            <a:p>
-              <a:pPr algn="ctr"/>
-              <a:r>
-                <a:rPr lang="en-IE" dirty="0">
-                  <a:solidFill>
-                    <a:schemeClr val="tx1"/>
-                  </a:solidFill>
-                </a:rPr>
-                <a:t>General rules</a:t>
-              </a:r>
-            </a:p>
-          </p:txBody>
-        </p:sp>
-        <p:sp>
-          <p:nvSpPr>
-            <p:cNvPr id="13" name="Rounded Rectangle 12">
-              <a:extLst>
-                <a:ext uri="{FF2B5EF4-FFF2-40B4-BE49-F238E27FC236}">
-                  <a16:creationId xmlns:a16="http://schemas.microsoft.com/office/drawing/2014/main" id="{C3349ACC-8844-8BAC-A273-483516E69108}"/>
-                </a:ext>
-              </a:extLst>
-            </p:cNvPr>
-            <p:cNvSpPr/>
-            <p:nvPr/>
-          </p:nvSpPr>
-          <p:spPr>
-            <a:xfrm>
-              <a:off x="10303669" y="3619256"/>
-              <a:ext cx="1692340" cy="568666"/>
-            </a:xfrm>
-            <a:prstGeom prst="roundRect">
-              <a:avLst/>
-            </a:prstGeom>
-            <a:solidFill>
-              <a:schemeClr val="accent4">
-                <a:lumMod val="40000"/>
-                <a:lumOff val="60000"/>
-              </a:schemeClr>
-            </a:solidFill>
-          </p:spPr>
-          <p:style>
-            <a:lnRef idx="2">
-              <a:schemeClr val="accent1">
-                <a:shade val="15000"/>
-              </a:schemeClr>
-            </a:lnRef>
-            <a:fillRef idx="1">
-              <a:schemeClr val="accent1"/>
-            </a:fillRef>
-            <a:effectRef idx="0">
-              <a:schemeClr val="accent1"/>
-            </a:effectRef>
-            <a:fontRef idx="minor">
-              <a:schemeClr val="lt1"/>
-            </a:fontRef>
-          </p:style>
-          <p:txBody>
-            <a:bodyPr rtlCol="0" anchor="ctr"/>
-            <a:lstStyle/>
-            <a:p>
-              <a:pPr algn="ctr"/>
-              <a:r>
-                <a:rPr lang="en-IE" dirty="0">
-                  <a:solidFill>
-                    <a:schemeClr val="tx1"/>
-                  </a:solidFill>
-                </a:rPr>
-                <a:t>Prediction</a:t>
-              </a:r>
-            </a:p>
-          </p:txBody>
-        </p:sp>
-        <p:cxnSp>
-          <p:nvCxnSpPr>
-            <p:cNvPr id="14" name="Straight Arrow Connector 13">
-              <a:extLst>
-                <a:ext uri="{FF2B5EF4-FFF2-40B4-BE49-F238E27FC236}">
-                  <a16:creationId xmlns:a16="http://schemas.microsoft.com/office/drawing/2014/main" id="{E94FD9C1-5003-0A92-7092-35C8850E6C32}"/>
-                </a:ext>
-              </a:extLst>
-            </p:cNvPr>
-            <p:cNvCxnSpPr>
-              <a:cxnSpLocks/>
-              <a:stCxn id="9" idx="0"/>
-              <a:endCxn id="11" idx="2"/>
-            </p:cNvCxnSpPr>
-            <p:nvPr/>
-          </p:nvCxnSpPr>
-          <p:spPr>
-            <a:xfrm flipV="1">
-              <a:off x="9325892" y="3043141"/>
-              <a:ext cx="808564" cy="576115"/>
-            </a:xfrm>
-            <a:prstGeom prst="straightConnector1">
-              <a:avLst/>
-            </a:prstGeom>
-            <a:ln w="28575">
-              <a:solidFill>
-                <a:schemeClr val="tx1"/>
-              </a:solidFill>
-              <a:headEnd w="lg" len="lg"/>
-              <a:tailEnd type="stealth" w="lg" len="lg"/>
-            </a:ln>
-          </p:spPr>
-          <p:style>
-            <a:lnRef idx="2">
-              <a:schemeClr val="accent1"/>
-            </a:lnRef>
-            <a:fillRef idx="0">
-              <a:schemeClr val="accent1"/>
-            </a:fillRef>
-            <a:effectRef idx="1">
-              <a:schemeClr val="accent1"/>
-            </a:effectRef>
-            <a:fontRef idx="minor">
-              <a:schemeClr val="tx1"/>
-            </a:fontRef>
-          </p:style>
-        </p:cxnSp>
-        <p:cxnSp>
-          <p:nvCxnSpPr>
-            <p:cNvPr id="15" name="Straight Arrow Connector 14">
-              <a:extLst>
-                <a:ext uri="{FF2B5EF4-FFF2-40B4-BE49-F238E27FC236}">
-                  <a16:creationId xmlns:a16="http://schemas.microsoft.com/office/drawing/2014/main" id="{C73D7ECB-232A-3A5C-3755-E8CA42F27EE0}"/>
-                </a:ext>
-              </a:extLst>
-            </p:cNvPr>
-            <p:cNvCxnSpPr>
-              <a:cxnSpLocks/>
-              <a:stCxn id="11" idx="2"/>
-              <a:endCxn id="13" idx="0"/>
-            </p:cNvCxnSpPr>
-            <p:nvPr/>
-          </p:nvCxnSpPr>
-          <p:spPr>
-            <a:xfrm>
-              <a:off x="10134456" y="3043141"/>
-              <a:ext cx="1015383" cy="576115"/>
-            </a:xfrm>
-            <a:prstGeom prst="straightConnector1">
-              <a:avLst/>
-            </a:prstGeom>
-            <a:ln w="28575">
-              <a:solidFill>
-                <a:schemeClr val="tx1"/>
-              </a:solidFill>
-              <a:headEnd w="lg" len="lg"/>
-              <a:tailEnd type="stealth" w="lg" len="lg"/>
-            </a:ln>
-          </p:spPr>
-          <p:style>
-            <a:lnRef idx="2">
-              <a:schemeClr val="accent1"/>
-            </a:lnRef>
-            <a:fillRef idx="0">
-              <a:schemeClr val="accent1"/>
-            </a:fillRef>
-            <a:effectRef idx="1">
-              <a:schemeClr val="accent1"/>
-            </a:effectRef>
-            <a:fontRef idx="minor">
-              <a:schemeClr val="tx1"/>
-            </a:fontRef>
-          </p:style>
-        </p:cxnSp>
-        <p:sp>
-          <p:nvSpPr>
-            <p:cNvPr id="16" name="TextBox 15">
-              <a:extLst>
-                <a:ext uri="{FF2B5EF4-FFF2-40B4-BE49-F238E27FC236}">
-                  <a16:creationId xmlns:a16="http://schemas.microsoft.com/office/drawing/2014/main" id="{003B6208-4C50-DFB6-8590-22AFF653913A}"/>
-                </a:ext>
-              </a:extLst>
-            </p:cNvPr>
-            <p:cNvSpPr txBox="1"/>
-            <p:nvPr/>
-          </p:nvSpPr>
-          <p:spPr>
-            <a:xfrm>
-              <a:off x="8442404" y="3055584"/>
-              <a:ext cx="1133644" cy="369332"/>
-            </a:xfrm>
-            <a:prstGeom prst="rect">
-              <a:avLst/>
-            </a:prstGeom>
-            <a:noFill/>
-          </p:spPr>
-          <p:txBody>
-            <a:bodyPr wrap="none" rtlCol="0">
-              <a:spAutoFit/>
-            </a:bodyPr>
-            <a:lstStyle/>
-            <a:p>
-              <a:r>
-                <a:rPr lang="en-IE" dirty="0">
-                  <a:solidFill>
-                    <a:schemeClr val="accent2">
-                      <a:lumMod val="75000"/>
-                    </a:schemeClr>
-                  </a:solidFill>
-                </a:rPr>
-                <a:t>Induction</a:t>
-              </a:r>
-            </a:p>
-          </p:txBody>
-        </p:sp>
-        <p:sp>
-          <p:nvSpPr>
-            <p:cNvPr id="19" name="TextBox 18">
-              <a:extLst>
-                <a:ext uri="{FF2B5EF4-FFF2-40B4-BE49-F238E27FC236}">
-                  <a16:creationId xmlns:a16="http://schemas.microsoft.com/office/drawing/2014/main" id="{27327A7B-8BD2-4F13-2509-F3FEF9C17D23}"/>
-                </a:ext>
-              </a:extLst>
-            </p:cNvPr>
-            <p:cNvSpPr txBox="1"/>
-            <p:nvPr/>
-          </p:nvSpPr>
-          <p:spPr>
-            <a:xfrm>
-              <a:off x="10767788" y="3050590"/>
-              <a:ext cx="1228221" cy="369332"/>
-            </a:xfrm>
-            <a:prstGeom prst="rect">
-              <a:avLst/>
-            </a:prstGeom>
-            <a:noFill/>
-          </p:spPr>
-          <p:txBody>
-            <a:bodyPr wrap="none" rtlCol="0">
-              <a:spAutoFit/>
-            </a:bodyPr>
-            <a:lstStyle/>
-            <a:p>
-              <a:r>
-                <a:rPr lang="en-IE" dirty="0">
-                  <a:solidFill>
-                    <a:schemeClr val="accent4">
-                      <a:lumMod val="50000"/>
-                    </a:schemeClr>
-                  </a:solidFill>
-                </a:rPr>
-                <a:t>Deduction</a:t>
-              </a:r>
-            </a:p>
-          </p:txBody>
-        </p:sp>
-      </p:grpSp>
-      <p:grpSp>
-        <p:nvGrpSpPr>
-          <p:cNvPr id="49" name="Group 48">
-            <a:extLst>
-              <a:ext uri="{FF2B5EF4-FFF2-40B4-BE49-F238E27FC236}">
-                <a16:creationId xmlns:a16="http://schemas.microsoft.com/office/drawing/2014/main" id="{F5037C2E-940F-82AC-5241-1A36F57627F6}"/>
-              </a:ext>
-            </a:extLst>
-          </p:cNvPr>
-          <p:cNvGrpSpPr/>
-          <p:nvPr/>
-        </p:nvGrpSpPr>
-        <p:grpSpPr>
-          <a:xfrm>
-            <a:off x="563671" y="1993403"/>
-            <a:ext cx="6636710" cy="4653617"/>
-            <a:chOff x="563671" y="1993403"/>
-            <a:chExt cx="6636710" cy="4653617"/>
-          </a:xfrm>
-        </p:grpSpPr>
-        <p:sp>
-          <p:nvSpPr>
-            <p:cNvPr id="26" name="TextBox 25">
-              <a:extLst>
-                <a:ext uri="{FF2B5EF4-FFF2-40B4-BE49-F238E27FC236}">
-                  <a16:creationId xmlns:a16="http://schemas.microsoft.com/office/drawing/2014/main" id="{BFC3C0DB-F93D-1CB1-D1AD-01E5FC898395}"/>
-                </a:ext>
-              </a:extLst>
-            </p:cNvPr>
-            <p:cNvSpPr txBox="1"/>
-            <p:nvPr/>
-          </p:nvSpPr>
-          <p:spPr>
-            <a:xfrm>
-              <a:off x="563671" y="2034927"/>
-              <a:ext cx="4427950" cy="1328023"/>
-            </a:xfrm>
-            <a:prstGeom prst="roundRect">
-              <a:avLst/>
-            </a:prstGeom>
-            <a:noFill/>
-            <a:ln>
-              <a:solidFill>
-                <a:schemeClr val="tx1"/>
-              </a:solidFill>
-            </a:ln>
-          </p:spPr>
-          <p:txBody>
-            <a:bodyPr wrap="square" rtlCol="0">
-              <a:spAutoFit/>
-            </a:bodyPr>
-            <a:lstStyle/>
-            <a:p>
-              <a:r>
-                <a:rPr lang="en-IE" dirty="0">
-                  <a:latin typeface="Proxima Nova A Light" panose="02000506030000020004" pitchFamily="2" charset="0"/>
-                </a:rPr>
-                <a:t>To be or not to be, that is the question: Whether ’tis nobler in the mind to suffer the slings and arrows of outrageous fortune,</a:t>
-              </a:r>
-            </a:p>
-          </p:txBody>
-        </p:sp>
-        <p:sp>
-          <p:nvSpPr>
-            <p:cNvPr id="27" name="TextBox 26">
-              <a:extLst>
-                <a:ext uri="{FF2B5EF4-FFF2-40B4-BE49-F238E27FC236}">
-                  <a16:creationId xmlns:a16="http://schemas.microsoft.com/office/drawing/2014/main" id="{9C66587D-8842-3E89-DB04-32872EE7B347}"/>
-                </a:ext>
-              </a:extLst>
-            </p:cNvPr>
-            <p:cNvSpPr txBox="1"/>
-            <p:nvPr/>
-          </p:nvSpPr>
-          <p:spPr>
-            <a:xfrm>
-              <a:off x="563671" y="4064563"/>
-              <a:ext cx="4427950" cy="1328023"/>
-            </a:xfrm>
-            <a:prstGeom prst="roundRect">
-              <a:avLst/>
-            </a:prstGeom>
-            <a:noFill/>
-            <a:ln>
-              <a:solidFill>
-                <a:schemeClr val="tx1"/>
-              </a:solidFill>
-            </a:ln>
-          </p:spPr>
-          <p:txBody>
-            <a:bodyPr wrap="square" rtlCol="0">
-              <a:spAutoFit/>
-            </a:bodyPr>
-            <a:lstStyle/>
-            <a:p>
-              <a:r>
-                <a:rPr lang="en-IE" dirty="0">
-                  <a:latin typeface="Proxima Nova A Light" panose="02000506030000020004" pitchFamily="2" charset="0"/>
-                </a:rPr>
-                <a:t>To be or </a:t>
-              </a:r>
-              <a:r>
-                <a:rPr lang="en-IE" dirty="0">
-                  <a:solidFill>
-                    <a:srgbClr val="FF0000"/>
-                  </a:solidFill>
-                  <a:highlight>
-                    <a:srgbClr val="FF0000"/>
-                  </a:highlight>
-                  <a:latin typeface="Proxima Nova A Light" panose="02000506030000020004" pitchFamily="2" charset="0"/>
-                </a:rPr>
-                <a:t>not</a:t>
-              </a:r>
-              <a:r>
-                <a:rPr lang="en-IE" dirty="0">
-                  <a:latin typeface="Proxima Nova A Light" panose="02000506030000020004" pitchFamily="2" charset="0"/>
-                </a:rPr>
-                <a:t> to be, that is the question: Whether ’tis </a:t>
-              </a:r>
-              <a:r>
-                <a:rPr lang="en-IE" dirty="0">
-                  <a:solidFill>
-                    <a:srgbClr val="FF0000"/>
-                  </a:solidFill>
-                  <a:highlight>
-                    <a:srgbClr val="FF0000"/>
-                  </a:highlight>
-                  <a:latin typeface="Proxima Nova A Light" panose="02000506030000020004" pitchFamily="2" charset="0"/>
-                </a:rPr>
-                <a:t>nobler</a:t>
-              </a:r>
-              <a:r>
-                <a:rPr lang="en-IE" dirty="0">
-                  <a:latin typeface="Proxima Nova A Light" panose="02000506030000020004" pitchFamily="2" charset="0"/>
-                </a:rPr>
-                <a:t> in the </a:t>
-              </a:r>
-              <a:r>
-                <a:rPr lang="en-IE" dirty="0">
-                  <a:solidFill>
-                    <a:srgbClr val="FF0000"/>
-                  </a:solidFill>
-                  <a:highlight>
-                    <a:srgbClr val="FF0000"/>
-                  </a:highlight>
-                  <a:latin typeface="Proxima Nova A Light" panose="02000506030000020004" pitchFamily="2" charset="0"/>
-                </a:rPr>
-                <a:t>mind</a:t>
-              </a:r>
-              <a:r>
-                <a:rPr lang="en-IE" dirty="0">
-                  <a:latin typeface="Proxima Nova A Light" panose="02000506030000020004" pitchFamily="2" charset="0"/>
-                </a:rPr>
-                <a:t> to suffer the slings and arrows of </a:t>
-              </a:r>
-              <a:r>
-                <a:rPr lang="en-IE" dirty="0">
-                  <a:solidFill>
-                    <a:srgbClr val="FF0000"/>
-                  </a:solidFill>
-                  <a:highlight>
-                    <a:srgbClr val="FF0000"/>
-                  </a:highlight>
-                  <a:latin typeface="Proxima Nova A Light" panose="02000506030000020004" pitchFamily="2" charset="0"/>
-                </a:rPr>
-                <a:t>outrageous</a:t>
-              </a:r>
-              <a:r>
-                <a:rPr lang="en-IE" dirty="0">
-                  <a:latin typeface="Proxima Nova A Light" panose="02000506030000020004" pitchFamily="2" charset="0"/>
-                </a:rPr>
-                <a:t> fortune,</a:t>
-              </a:r>
-            </a:p>
-          </p:txBody>
-        </p:sp>
-        <p:cxnSp>
-          <p:nvCxnSpPr>
-            <p:cNvPr id="29" name="Straight Arrow Connector 28">
-              <a:extLst>
-                <a:ext uri="{FF2B5EF4-FFF2-40B4-BE49-F238E27FC236}">
-                  <a16:creationId xmlns:a16="http://schemas.microsoft.com/office/drawing/2014/main" id="{23C0BBD2-D15E-6C15-B400-DEC33A41028E}"/>
-                </a:ext>
-              </a:extLst>
-            </p:cNvPr>
-            <p:cNvCxnSpPr>
-              <a:stCxn id="26" idx="2"/>
-              <a:endCxn id="27" idx="0"/>
-            </p:cNvCxnSpPr>
-            <p:nvPr/>
-          </p:nvCxnSpPr>
-          <p:spPr>
-            <a:xfrm>
-              <a:off x="2777646" y="3362950"/>
-              <a:ext cx="0" cy="701613"/>
-            </a:xfrm>
-            <a:prstGeom prst="straightConnector1">
-              <a:avLst/>
-            </a:prstGeom>
-            <a:ln w="19050">
-              <a:solidFill>
-                <a:schemeClr val="tx1"/>
-              </a:solidFill>
-              <a:tailEnd type="stealth" w="lg" len="lg"/>
-            </a:ln>
-          </p:spPr>
-          <p:style>
-            <a:lnRef idx="2">
-              <a:schemeClr val="accent1"/>
-            </a:lnRef>
-            <a:fillRef idx="0">
-              <a:schemeClr val="accent1"/>
-            </a:fillRef>
-            <a:effectRef idx="1">
-              <a:schemeClr val="accent1"/>
-            </a:effectRef>
-            <a:fontRef idx="minor">
-              <a:schemeClr val="tx1"/>
-            </a:fontRef>
-          </p:style>
-        </p:cxnSp>
-        <p:sp>
-          <p:nvSpPr>
-            <p:cNvPr id="30" name="TextBox 29">
-              <a:extLst>
-                <a:ext uri="{FF2B5EF4-FFF2-40B4-BE49-F238E27FC236}">
-                  <a16:creationId xmlns:a16="http://schemas.microsoft.com/office/drawing/2014/main" id="{6BD667A3-4FF7-4CA9-812A-AEFBEB323CC5}"/>
-                </a:ext>
-              </a:extLst>
-            </p:cNvPr>
-            <p:cNvSpPr txBox="1"/>
-            <p:nvPr/>
-          </p:nvSpPr>
-          <p:spPr>
-            <a:xfrm>
-              <a:off x="2832554" y="3522523"/>
-              <a:ext cx="2218043" cy="369332"/>
-            </a:xfrm>
-            <a:prstGeom prst="rect">
-              <a:avLst/>
-            </a:prstGeom>
-            <a:noFill/>
-          </p:spPr>
-          <p:txBody>
-            <a:bodyPr wrap="none" rtlCol="0">
-              <a:spAutoFit/>
-            </a:bodyPr>
-            <a:lstStyle/>
-            <a:p>
-              <a:r>
-                <a:rPr lang="en-IE" dirty="0"/>
-                <a:t>Mask words (tokens)</a:t>
-              </a:r>
-            </a:p>
-          </p:txBody>
-        </p:sp>
-        <p:pic>
-          <p:nvPicPr>
-            <p:cNvPr id="31" name="Graphic 30" descr="Robot outline">
-              <a:extLst>
-                <a:ext uri="{FF2B5EF4-FFF2-40B4-BE49-F238E27FC236}">
-                  <a16:creationId xmlns:a16="http://schemas.microsoft.com/office/drawing/2014/main" id="{CD1C25DD-0494-7156-31C9-810A09BF2B5A}"/>
-                </a:ext>
-              </a:extLst>
-            </p:cNvPr>
-            <p:cNvPicPr>
-              <a:picLocks noChangeAspect="1"/>
-            </p:cNvPicPr>
-            <p:nvPr/>
-          </p:nvPicPr>
-          <p:blipFill>
-            <a:blip r:embed="rId4">
-              <a:extLst>
-                <a:ext uri="{96DAC541-7B7A-43D3-8B79-37D633B846F1}">
-                  <asvg:svgBlip xmlns:asvg="http://schemas.microsoft.com/office/drawing/2016/SVG/main" r:embed="rId5"/>
-                </a:ext>
-              </a:extLst>
-            </a:blip>
-            <a:stretch>
-              <a:fillRect/>
-            </a:stretch>
-          </p:blipFill>
-          <p:spPr>
-            <a:xfrm>
-              <a:off x="5486398" y="2955244"/>
-              <a:ext cx="1328023" cy="1328023"/>
-            </a:xfrm>
-            <a:prstGeom prst="rect">
-              <a:avLst/>
-            </a:prstGeom>
-          </p:spPr>
-        </p:pic>
-        <p:cxnSp>
-          <p:nvCxnSpPr>
-            <p:cNvPr id="33" name="Elbow Connector 32">
-              <a:extLst>
-                <a:ext uri="{FF2B5EF4-FFF2-40B4-BE49-F238E27FC236}">
-                  <a16:creationId xmlns:a16="http://schemas.microsoft.com/office/drawing/2014/main" id="{DF5976B2-0CF5-37BC-0EA8-D095225977E7}"/>
-                </a:ext>
-              </a:extLst>
-            </p:cNvPr>
-            <p:cNvCxnSpPr>
-              <a:stCxn id="27" idx="3"/>
-              <a:endCxn id="31" idx="2"/>
-            </p:cNvCxnSpPr>
-            <p:nvPr/>
-          </p:nvCxnSpPr>
-          <p:spPr>
-            <a:xfrm flipV="1">
-              <a:off x="4991621" y="4283267"/>
-              <a:ext cx="1158789" cy="445308"/>
-            </a:xfrm>
-            <a:prstGeom prst="bentConnector2">
-              <a:avLst/>
-            </a:prstGeom>
-            <a:ln>
-              <a:solidFill>
-                <a:schemeClr val="tx1"/>
-              </a:solidFill>
-              <a:tailEnd type="stealth" w="lg" len="lg"/>
-            </a:ln>
-          </p:spPr>
-          <p:style>
-            <a:lnRef idx="2">
-              <a:schemeClr val="accent1"/>
-            </a:lnRef>
-            <a:fillRef idx="0">
-              <a:schemeClr val="accent1"/>
-            </a:fillRef>
-            <a:effectRef idx="1">
-              <a:schemeClr val="accent1"/>
-            </a:effectRef>
-            <a:fontRef idx="minor">
-              <a:schemeClr val="tx1"/>
-            </a:fontRef>
-          </p:style>
-        </p:cxnSp>
-        <p:cxnSp>
-          <p:nvCxnSpPr>
-            <p:cNvPr id="34" name="Elbow Connector 33">
-              <a:extLst>
-                <a:ext uri="{FF2B5EF4-FFF2-40B4-BE49-F238E27FC236}">
-                  <a16:creationId xmlns:a16="http://schemas.microsoft.com/office/drawing/2014/main" id="{D3DEEDBA-CA68-9AD2-7184-F4E52BF69FE2}"/>
-                </a:ext>
-              </a:extLst>
-            </p:cNvPr>
-            <p:cNvCxnSpPr>
-              <a:cxnSpLocks/>
-              <a:stCxn id="31" idx="0"/>
-              <a:endCxn id="26" idx="3"/>
-            </p:cNvCxnSpPr>
-            <p:nvPr/>
-          </p:nvCxnSpPr>
-          <p:spPr>
-            <a:xfrm rot="16200000" flipV="1">
-              <a:off x="5442864" y="2247697"/>
-              <a:ext cx="256305" cy="1158789"/>
-            </a:xfrm>
-            <a:prstGeom prst="bentConnector2">
-              <a:avLst/>
-            </a:prstGeom>
-            <a:ln>
-              <a:solidFill>
-                <a:schemeClr val="tx1"/>
-              </a:solidFill>
-              <a:tailEnd type="stealth" w="lg" len="lg"/>
-            </a:ln>
-          </p:spPr>
-          <p:style>
-            <a:lnRef idx="2">
-              <a:schemeClr val="accent1"/>
-            </a:lnRef>
-            <a:fillRef idx="0">
-              <a:schemeClr val="accent1"/>
-            </a:fillRef>
-            <a:effectRef idx="1">
-              <a:schemeClr val="accent1"/>
-            </a:effectRef>
-            <a:fontRef idx="minor">
-              <a:schemeClr val="tx1"/>
-            </a:fontRef>
-          </p:style>
-        </p:cxnSp>
-        <p:sp>
-          <p:nvSpPr>
-            <p:cNvPr id="37" name="TextBox 36">
-              <a:extLst>
-                <a:ext uri="{FF2B5EF4-FFF2-40B4-BE49-F238E27FC236}">
-                  <a16:creationId xmlns:a16="http://schemas.microsoft.com/office/drawing/2014/main" id="{1A33CCAF-E890-EF63-85FD-E225095F3D04}"/>
-                </a:ext>
-              </a:extLst>
-            </p:cNvPr>
-            <p:cNvSpPr txBox="1"/>
-            <p:nvPr/>
-          </p:nvSpPr>
-          <p:spPr>
-            <a:xfrm>
-              <a:off x="5165166" y="1993403"/>
-              <a:ext cx="2035215" cy="646331"/>
-            </a:xfrm>
-            <a:prstGeom prst="rect">
-              <a:avLst/>
-            </a:prstGeom>
-            <a:noFill/>
-          </p:spPr>
-          <p:txBody>
-            <a:bodyPr wrap="square" rtlCol="0">
-              <a:spAutoFit/>
-            </a:bodyPr>
-            <a:lstStyle/>
-            <a:p>
-              <a:r>
-                <a:rPr lang="en-IE" dirty="0"/>
-                <a:t>Reconstruct original sentence</a:t>
-              </a:r>
-            </a:p>
-          </p:txBody>
-        </p:sp>
-        <p:sp>
-          <p:nvSpPr>
-            <p:cNvPr id="38" name="TextBox 37">
-              <a:extLst>
-                <a:ext uri="{FF2B5EF4-FFF2-40B4-BE49-F238E27FC236}">
-                  <a16:creationId xmlns:a16="http://schemas.microsoft.com/office/drawing/2014/main" id="{02EB5667-A217-7534-CFD3-8C9DB8816ADF}"/>
-                </a:ext>
-              </a:extLst>
-            </p:cNvPr>
-            <p:cNvSpPr txBox="1"/>
-            <p:nvPr/>
-          </p:nvSpPr>
-          <p:spPr>
-            <a:xfrm>
-              <a:off x="5130029" y="4787138"/>
-              <a:ext cx="881973" cy="369332"/>
-            </a:xfrm>
-            <a:prstGeom prst="rect">
-              <a:avLst/>
-            </a:prstGeom>
-            <a:noFill/>
-          </p:spPr>
-          <p:txBody>
-            <a:bodyPr wrap="none" rtlCol="0">
-              <a:spAutoFit/>
-            </a:bodyPr>
-            <a:lstStyle/>
-            <a:p>
-              <a:r>
-                <a:rPr lang="en-IE" dirty="0"/>
-                <a:t>p(w | T)</a:t>
-              </a:r>
-            </a:p>
-          </p:txBody>
-        </p:sp>
-        <p:cxnSp>
-          <p:nvCxnSpPr>
-            <p:cNvPr id="39" name="Straight Arrow Connector 38">
-              <a:extLst>
-                <a:ext uri="{FF2B5EF4-FFF2-40B4-BE49-F238E27FC236}">
-                  <a16:creationId xmlns:a16="http://schemas.microsoft.com/office/drawing/2014/main" id="{8B4E3A88-143E-27E3-D2A6-CBE0F5D0BB09}"/>
-                </a:ext>
-              </a:extLst>
-            </p:cNvPr>
-            <p:cNvCxnSpPr>
-              <a:cxnSpLocks/>
-              <a:stCxn id="38" idx="2"/>
-              <a:endCxn id="40" idx="0"/>
-            </p:cNvCxnSpPr>
-            <p:nvPr/>
-          </p:nvCxnSpPr>
-          <p:spPr>
-            <a:xfrm flipH="1">
-              <a:off x="5571015" y="5156470"/>
-              <a:ext cx="1" cy="567220"/>
-            </a:xfrm>
-            <a:prstGeom prst="straightConnector1">
-              <a:avLst/>
-            </a:prstGeom>
-            <a:ln w="19050">
-              <a:solidFill>
-                <a:schemeClr val="tx1"/>
-              </a:solidFill>
-              <a:tailEnd type="stealth" w="lg" len="lg"/>
-            </a:ln>
-          </p:spPr>
-          <p:style>
-            <a:lnRef idx="2">
-              <a:schemeClr val="accent1"/>
-            </a:lnRef>
-            <a:fillRef idx="0">
-              <a:schemeClr val="accent1"/>
-            </a:fillRef>
-            <a:effectRef idx="1">
-              <a:schemeClr val="accent1"/>
-            </a:effectRef>
-            <a:fontRef idx="minor">
-              <a:schemeClr val="tx1"/>
-            </a:fontRef>
-          </p:style>
-        </p:cxnSp>
-        <p:sp>
-          <p:nvSpPr>
-            <p:cNvPr id="40" name="TextBox 39">
-              <a:extLst>
-                <a:ext uri="{FF2B5EF4-FFF2-40B4-BE49-F238E27FC236}">
-                  <a16:creationId xmlns:a16="http://schemas.microsoft.com/office/drawing/2014/main" id="{783816DB-CF9A-90AD-E6E5-A7C84F34F6E2}"/>
-                </a:ext>
-              </a:extLst>
-            </p:cNvPr>
-            <p:cNvSpPr txBox="1"/>
-            <p:nvPr/>
-          </p:nvSpPr>
-          <p:spPr>
-            <a:xfrm>
-              <a:off x="4283700" y="5723690"/>
-              <a:ext cx="2574629" cy="923330"/>
-            </a:xfrm>
-            <a:prstGeom prst="rect">
-              <a:avLst/>
-            </a:prstGeom>
-            <a:noFill/>
-          </p:spPr>
-          <p:txBody>
-            <a:bodyPr wrap="square" rtlCol="0">
-              <a:spAutoFit/>
-            </a:bodyPr>
-            <a:lstStyle/>
-            <a:p>
-              <a:r>
-                <a:rPr lang="en-IE" dirty="0"/>
-                <a:t>Conditional probability of word (</a:t>
-              </a:r>
-              <a:r>
-                <a:rPr lang="en-IE" i="1" dirty="0"/>
-                <a:t>w</a:t>
-              </a:r>
-              <a:r>
-                <a:rPr lang="en-IE" dirty="0"/>
-                <a:t>), given the rest of the text (</a:t>
-              </a:r>
-              <a:r>
-                <a:rPr lang="en-IE" i="1" dirty="0"/>
-                <a:t>T</a:t>
-              </a:r>
-              <a:r>
-                <a:rPr lang="en-IE" dirty="0"/>
-                <a:t>)</a:t>
-              </a:r>
-            </a:p>
-          </p:txBody>
-        </p:sp>
-      </p:grpSp>
-    </p:spTree>
-    <p:extLst>
-      <p:ext uri="{BB962C8B-B14F-4D97-AF65-F5344CB8AC3E}">
-        <p14:creationId xmlns:p14="http://schemas.microsoft.com/office/powerpoint/2010/main" val="3446657799"/>
       </p:ext>
     </p:extLst>
   </p:cSld>

</xml_diff>